<commit_message>
LISTE INGREDIENTS DE MERDE
</commit_message>
<xml_diff>
--- a/Fichiers analyse/IKitchen.pptx
+++ b/Fichiers analyse/IKitchen.pptx
@@ -5,10 +5,10 @@
     <p:sldMasterId id="2147483648" r:id="rId4"/>
   </p:sldMasterIdLst>
   <p:notesMasterIdLst>
-    <p:notesMasterId r:id="rId24"/>
+    <p:notesMasterId r:id="rId26"/>
   </p:notesMasterIdLst>
   <p:handoutMasterIdLst>
-    <p:handoutMasterId r:id="rId25"/>
+    <p:handoutMasterId r:id="rId27"/>
   </p:handoutMasterIdLst>
   <p:sldIdLst>
     <p:sldId id="256" r:id="rId5"/>
@@ -30,6 +30,8 @@
     <p:sldId id="276" r:id="rId21"/>
     <p:sldId id="278" r:id="rId22"/>
     <p:sldId id="283" r:id="rId23"/>
+    <p:sldId id="285" r:id="rId24"/>
+    <p:sldId id="286" r:id="rId25"/>
   </p:sldIdLst>
   <p:sldSz cx="12188825" cy="6858000"/>
   <p:notesSz cx="6858000" cy="9144000"/>
@@ -245,7 +247,7 @@
             <a:pPr rtl="0"/>
             <a:fld id="{439A2291-0035-4D64-A7A5-F36AC1AF399D}" type="datetime1">
               <a:rPr lang="fr-FR" smtClean="0"/>
-              <a:t>19/05/2018</a:t>
+              <a:t>21/05/2018</a:t>
             </a:fld>
             <a:endParaRPr lang="fr-FR" dirty="0"/>
           </a:p>
@@ -415,7 +417,7 @@
             <a:pPr rtl="0"/>
             <a:fld id="{4419B5CD-CE9D-4F17-8DE3-0045DF2A06F1}" type="datetime1">
               <a:rPr lang="fr-FR" noProof="0" smtClean="0"/>
-              <a:t>19/05/2018</a:t>
+              <a:t>21/05/2018</a:t>
             </a:fld>
             <a:endParaRPr lang="fr-FR" noProof="0" dirty="0"/>
           </a:p>
@@ -1584,7 +1586,7 @@
             <a:pPr rtl="0"/>
             <a:fld id="{FFED7672-6A17-4383-8E11-B703B2F244DD}" type="datetime1">
               <a:rPr lang="fr-FR" noProof="0" smtClean="0"/>
-              <a:t>19/05/2018</a:t>
+              <a:t>21/05/2018</a:t>
             </a:fld>
             <a:endParaRPr lang="fr-FR" noProof="0" dirty="0"/>
           </a:p>
@@ -1789,7 +1791,7 @@
             <a:pPr rtl="0"/>
             <a:fld id="{E1450B91-7D53-40A4-B2F5-AA5E0059FF2C}" type="datetime1">
               <a:rPr lang="fr-FR" noProof="0" smtClean="0"/>
-              <a:t>19/05/2018</a:t>
+              <a:t>21/05/2018</a:t>
             </a:fld>
             <a:endParaRPr lang="fr-FR" noProof="0" dirty="0"/>
           </a:p>
@@ -2343,7 +2345,7 @@
             <a:pPr rtl="0"/>
             <a:fld id="{3B681A6B-7357-4D25-8FC7-B90E847B95A8}" type="datetime1">
               <a:rPr lang="fr-FR" noProof="0" smtClean="0"/>
-              <a:t>19/05/2018</a:t>
+              <a:t>21/05/2018</a:t>
             </a:fld>
             <a:endParaRPr lang="fr-FR" noProof="0" dirty="0"/>
           </a:p>
@@ -2548,7 +2550,7 @@
             <a:pPr rtl="0"/>
             <a:fld id="{80C5A66A-4BD8-442B-B2CE-4DDC3F185A34}" type="datetime1">
               <a:rPr lang="fr-FR" noProof="0" smtClean="0"/>
-              <a:t>19/05/2018</a:t>
+              <a:t>21/05/2018</a:t>
             </a:fld>
             <a:endParaRPr lang="fr-FR" noProof="0" dirty="0"/>
           </a:p>
@@ -3156,7 +3158,7 @@
             <a:pPr rtl="0"/>
             <a:fld id="{70B7FDAA-B5D3-4E22-A82E-02191A2150B9}" type="datetime1">
               <a:rPr lang="fr-FR" noProof="0" smtClean="0"/>
-              <a:t>19/05/2018</a:t>
+              <a:t>21/05/2018</a:t>
             </a:fld>
             <a:endParaRPr lang="fr-FR" noProof="0" dirty="0"/>
           </a:p>
@@ -3472,7 +3474,7 @@
             <a:pPr rtl="0"/>
             <a:fld id="{BADF8559-33F4-416D-A710-49A46B99982C}" type="datetime1">
               <a:rPr lang="fr-FR" noProof="0" smtClean="0"/>
-              <a:t>19/05/2018</a:t>
+              <a:t>21/05/2018</a:t>
             </a:fld>
             <a:endParaRPr lang="fr-FR" noProof="0" dirty="0"/>
           </a:p>
@@ -3938,7 +3940,7 @@
             <a:pPr rtl="0"/>
             <a:fld id="{CF92E5DF-51C7-4012-82D0-A6F20F8A1C3B}" type="datetime1">
               <a:rPr lang="fr-FR" noProof="0" smtClean="0"/>
-              <a:t>19/05/2018</a:t>
+              <a:t>21/05/2018</a:t>
             </a:fld>
             <a:endParaRPr lang="fr-FR" noProof="0" dirty="0"/>
           </a:p>
@@ -4075,7 +4077,7 @@
             <a:pPr rtl="0"/>
             <a:fld id="{A66353DA-E3F6-4188-A918-D5978D2DC352}" type="datetime1">
               <a:rPr lang="fr-FR" noProof="0" smtClean="0"/>
-              <a:t>19/05/2018</a:t>
+              <a:t>21/05/2018</a:t>
             </a:fld>
             <a:endParaRPr lang="fr-FR" noProof="0" dirty="0"/>
           </a:p>
@@ -4371,7 +4373,7 @@
             <a:pPr rtl="0"/>
             <a:fld id="{227CDB5E-87EB-400A-AF0C-7B4E7074CB2E}" type="datetime1">
               <a:rPr lang="fr-FR" noProof="0" smtClean="0"/>
-              <a:t>19/05/2018</a:t>
+              <a:t>21/05/2018</a:t>
             </a:fld>
             <a:endParaRPr lang="fr-FR" noProof="0" dirty="0"/>
           </a:p>
@@ -4674,7 +4676,7 @@
             <a:pPr rtl="0"/>
             <a:fld id="{9B92CBFA-02BE-4A2B-B3DF-CE42DCACD8FF}" type="datetime1">
               <a:rPr lang="fr-FR" noProof="0" smtClean="0"/>
-              <a:t>19/05/2018</a:t>
+              <a:t>21/05/2018</a:t>
             </a:fld>
             <a:endParaRPr lang="fr-FR" noProof="0" dirty="0"/>
           </a:p>
@@ -4963,7 +4965,7 @@
             <a:pPr rtl="0"/>
             <a:fld id="{5B8044B4-8DC2-481B-A751-5605C20AC4B9}" type="datetime1">
               <a:rPr lang="fr-FR" noProof="0" smtClean="0"/>
-              <a:t>19/05/2018</a:t>
+              <a:t>21/05/2018</a:t>
             </a:fld>
             <a:endParaRPr lang="fr-FR" noProof="0" dirty="0"/>
           </a:p>
@@ -5546,7 +5548,7 @@
             <a:pPr rtl="0"/>
             <a:fld id="{01DFB95D-D541-4088-8BCE-2FF8F06A12B2}" type="datetime1">
               <a:rPr lang="fr-FR" noProof="0" smtClean="0"/>
-              <a:t>19/05/2018</a:t>
+              <a:t>21/05/2018</a:t>
             </a:fld>
             <a:endParaRPr lang="fr-FR" noProof="0" dirty="0"/>
           </a:p>
@@ -7428,7 +7430,7 @@
         </p:blipFill>
         <p:spPr>
           <a:xfrm>
-            <a:off x="1485900" y="2306273"/>
+            <a:off x="1057606" y="2416629"/>
             <a:ext cx="3753374" cy="3343742"/>
           </a:xfrm>
           <a:prstGeom prst="rect">
@@ -7450,7 +7452,7 @@
         </p:nvSpPr>
         <p:spPr>
           <a:xfrm>
-            <a:off x="6454452" y="1772816"/>
+            <a:off x="6643999" y="540539"/>
             <a:ext cx="4248473" cy="2520280"/>
           </a:xfrm>
           <a:prstGeom prst="ellipse">
@@ -7510,6 +7512,42 @@
           </a:p>
         </p:txBody>
       </p:sp>
+      <p:pic>
+        <p:nvPicPr>
+          <p:cNvPr id="5" name="Image 4">
+            <a:extLst>
+              <a:ext uri="{FF2B5EF4-FFF2-40B4-BE49-F238E27FC236}">
+                <a16:creationId xmlns:a16="http://schemas.microsoft.com/office/drawing/2014/main" id="{BA8BDA2F-C2C1-48AB-9975-2DE39E173172}"/>
+              </a:ext>
+            </a:extLst>
+          </p:cNvPr>
+          <p:cNvPicPr>
+            <a:picLocks noChangeAspect="1"/>
+          </p:cNvPicPr>
+          <p:nvPr/>
+        </p:nvPicPr>
+        <p:blipFill>
+          <a:blip r:embed="rId3">
+            <a:extLst>
+              <a:ext uri="{28A0092B-C50C-407E-A947-70E740481C1C}">
+                <a14:useLocalDpi xmlns:a14="http://schemas.microsoft.com/office/drawing/2010/main" val="0"/>
+              </a:ext>
+            </a:extLst>
+          </a:blip>
+          <a:stretch>
+            <a:fillRect/>
+          </a:stretch>
+        </p:blipFill>
+        <p:spPr>
+          <a:xfrm>
+            <a:off x="4805920" y="3212746"/>
+            <a:ext cx="7382905" cy="3105583"/>
+          </a:xfrm>
+          <a:prstGeom prst="rect">
+            <a:avLst/>
+          </a:prstGeom>
+        </p:spPr>
+      </p:pic>
     </p:spTree>
     <p:extLst>
       <p:ext uri="{BB962C8B-B14F-4D97-AF65-F5344CB8AC3E}">
@@ -8399,6 +8437,703 @@
     <p:extLst>
       <p:ext uri="{BB962C8B-B14F-4D97-AF65-F5344CB8AC3E}">
         <p14:creationId xmlns:p14="http://schemas.microsoft.com/office/powerpoint/2010/main" val="2041341814"/>
+      </p:ext>
+    </p:extLst>
+  </p:cSld>
+  <p:clrMapOvr>
+    <a:masterClrMapping/>
+  </p:clrMapOvr>
+  <mc:AlternateContent xmlns:mc="http://schemas.openxmlformats.org/markup-compatibility/2006" xmlns:p14="http://schemas.microsoft.com/office/powerpoint/2010/main">
+    <mc:Choice Requires="p14">
+      <p:transition spd="med" p14:dur="700">
+        <p:fade/>
+      </p:transition>
+    </mc:Choice>
+    <mc:Fallback xmlns="">
+      <p:transition spd="med">
+        <p:fade/>
+      </p:transition>
+    </mc:Fallback>
+  </mc:AlternateContent>
+</p:sld>
+</file>
+
+<file path=ppt/slides/slide20.xml><?xml version="1.0" encoding="utf-8"?>
+<p:sld xmlns:a="http://schemas.openxmlformats.org/drawingml/2006/main" xmlns:r="http://schemas.openxmlformats.org/officeDocument/2006/relationships" xmlns:p="http://schemas.openxmlformats.org/presentationml/2006/main">
+  <p:cSld>
+    <p:spTree>
+      <p:nvGrpSpPr>
+        <p:cNvPr id="1" name=""/>
+        <p:cNvGrpSpPr/>
+        <p:nvPr/>
+      </p:nvGrpSpPr>
+      <p:grpSpPr>
+        <a:xfrm>
+          <a:off x="0" y="0"/>
+          <a:ext cx="0" cy="0"/>
+          <a:chOff x="0" y="0"/>
+          <a:chExt cx="0" cy="0"/>
+        </a:xfrm>
+      </p:grpSpPr>
+      <p:sp>
+        <p:nvSpPr>
+          <p:cNvPr id="2" name="Titre 1">
+            <a:extLst>
+              <a:ext uri="{FF2B5EF4-FFF2-40B4-BE49-F238E27FC236}">
+                <a16:creationId xmlns:a16="http://schemas.microsoft.com/office/drawing/2014/main" id="{B43AFA5A-ED24-437F-8675-C9BCC48D2814}"/>
+              </a:ext>
+            </a:extLst>
+          </p:cNvPr>
+          <p:cNvSpPr>
+            <a:spLocks noGrp="1"/>
+          </p:cNvSpPr>
+          <p:nvPr>
+            <p:ph type="title"/>
+          </p:nvPr>
+        </p:nvSpPr>
+        <p:spPr/>
+        <p:txBody>
+          <a:bodyPr/>
+          <a:lstStyle/>
+          <a:p>
+            <a:r>
+              <a:rPr lang="fr-BE" dirty="0"/>
+              <a:t>Conclusions</a:t>
+            </a:r>
+          </a:p>
+        </p:txBody>
+      </p:sp>
+      <p:sp>
+        <p:nvSpPr>
+          <p:cNvPr id="3" name="Espace réservé du texte 2">
+            <a:extLst>
+              <a:ext uri="{FF2B5EF4-FFF2-40B4-BE49-F238E27FC236}">
+                <a16:creationId xmlns:a16="http://schemas.microsoft.com/office/drawing/2014/main" id="{DF704CA3-390A-4E10-8E74-1648D10E72F6}"/>
+              </a:ext>
+            </a:extLst>
+          </p:cNvPr>
+          <p:cNvSpPr>
+            <a:spLocks noGrp="1"/>
+          </p:cNvSpPr>
+          <p:nvPr>
+            <p:ph type="body" idx="1"/>
+          </p:nvPr>
+        </p:nvSpPr>
+        <p:spPr/>
+        <p:txBody>
+          <a:bodyPr/>
+          <a:lstStyle/>
+          <a:p>
+            <a:r>
+              <a:rPr lang="fr-BE" dirty="0" err="1"/>
+              <a:t>What</a:t>
+            </a:r>
+            <a:r>
+              <a:rPr lang="fr-BE" dirty="0"/>
+              <a:t> are </a:t>
+            </a:r>
+            <a:r>
+              <a:rPr lang="fr-BE" dirty="0" err="1"/>
+              <a:t>our</a:t>
+            </a:r>
+            <a:r>
+              <a:rPr lang="fr-BE" dirty="0"/>
+              <a:t> </a:t>
+            </a:r>
+            <a:r>
+              <a:rPr lang="fr-BE" dirty="0" err="1"/>
+              <a:t>thoughts</a:t>
+            </a:r>
+            <a:r>
+              <a:rPr lang="fr-BE" dirty="0"/>
+              <a:t> about </a:t>
+            </a:r>
+            <a:r>
+              <a:rPr lang="fr-BE" dirty="0" err="1"/>
+              <a:t>this</a:t>
+            </a:r>
+            <a:r>
+              <a:rPr lang="fr-BE" dirty="0"/>
+              <a:t> </a:t>
+            </a:r>
+            <a:r>
+              <a:rPr lang="fr-BE" dirty="0" err="1"/>
+              <a:t>project</a:t>
+            </a:r>
+            <a:r>
+              <a:rPr lang="fr-BE" dirty="0"/>
+              <a:t> ?</a:t>
+            </a:r>
+          </a:p>
+        </p:txBody>
+      </p:sp>
+    </p:spTree>
+    <p:extLst>
+      <p:ext uri="{BB962C8B-B14F-4D97-AF65-F5344CB8AC3E}">
+        <p14:creationId xmlns:p14="http://schemas.microsoft.com/office/powerpoint/2010/main" val="2810083180"/>
+      </p:ext>
+    </p:extLst>
+  </p:cSld>
+  <p:clrMapOvr>
+    <a:masterClrMapping/>
+  </p:clrMapOvr>
+  <mc:AlternateContent xmlns:mc="http://schemas.openxmlformats.org/markup-compatibility/2006" xmlns:p14="http://schemas.microsoft.com/office/powerpoint/2010/main">
+    <mc:Choice Requires="p14">
+      <p:transition spd="med" p14:dur="700">
+        <p:fade/>
+      </p:transition>
+    </mc:Choice>
+    <mc:Fallback xmlns="">
+      <p:transition spd="med">
+        <p:fade/>
+      </p:transition>
+    </mc:Fallback>
+  </mc:AlternateContent>
+</p:sld>
+</file>
+
+<file path=ppt/slides/slide21.xml><?xml version="1.0" encoding="utf-8"?>
+<p:sld xmlns:a="http://schemas.openxmlformats.org/drawingml/2006/main" xmlns:r="http://schemas.openxmlformats.org/officeDocument/2006/relationships" xmlns:p="http://schemas.openxmlformats.org/presentationml/2006/main">
+  <p:cSld>
+    <p:spTree>
+      <p:nvGrpSpPr>
+        <p:cNvPr id="1" name=""/>
+        <p:cNvGrpSpPr/>
+        <p:nvPr/>
+      </p:nvGrpSpPr>
+      <p:grpSpPr>
+        <a:xfrm>
+          <a:off x="0" y="0"/>
+          <a:ext cx="0" cy="0"/>
+          <a:chOff x="0" y="0"/>
+          <a:chExt cx="0" cy="0"/>
+        </a:xfrm>
+      </p:grpSpPr>
+      <p:sp>
+        <p:nvSpPr>
+          <p:cNvPr id="2" name="Titre 1">
+            <a:extLst>
+              <a:ext uri="{FF2B5EF4-FFF2-40B4-BE49-F238E27FC236}">
+                <a16:creationId xmlns:a16="http://schemas.microsoft.com/office/drawing/2014/main" id="{5109000C-F2A5-4981-9FD6-53BC3D3C3387}"/>
+              </a:ext>
+            </a:extLst>
+          </p:cNvPr>
+          <p:cNvSpPr>
+            <a:spLocks noGrp="1"/>
+          </p:cNvSpPr>
+          <p:nvPr>
+            <p:ph type="title"/>
+          </p:nvPr>
+        </p:nvSpPr>
+        <p:spPr/>
+        <p:txBody>
+          <a:bodyPr/>
+          <a:lstStyle/>
+          <a:p>
+            <a:r>
+              <a:rPr lang="fr-BE" dirty="0"/>
+              <a:t>Conclusions</a:t>
+            </a:r>
+          </a:p>
+        </p:txBody>
+      </p:sp>
+      <p:sp>
+        <p:nvSpPr>
+          <p:cNvPr id="3" name="Espace réservé du texte 2">
+            <a:extLst>
+              <a:ext uri="{FF2B5EF4-FFF2-40B4-BE49-F238E27FC236}">
+                <a16:creationId xmlns:a16="http://schemas.microsoft.com/office/drawing/2014/main" id="{87CD1E14-1038-45A3-955B-6A9CDDE02F9E}"/>
+              </a:ext>
+            </a:extLst>
+          </p:cNvPr>
+          <p:cNvSpPr>
+            <a:spLocks noGrp="1"/>
+          </p:cNvSpPr>
+          <p:nvPr>
+            <p:ph type="body" idx="1"/>
+          </p:nvPr>
+        </p:nvSpPr>
+        <p:spPr>
+          <a:xfrm>
+            <a:off x="1141412" y="1524000"/>
+            <a:ext cx="2720752" cy="816429"/>
+          </a:xfrm>
+        </p:spPr>
+        <p:txBody>
+          <a:bodyPr/>
+          <a:lstStyle/>
+          <a:p>
+            <a:r>
+              <a:rPr lang="fr-BE" dirty="0" err="1"/>
+              <a:t>Flavian</a:t>
+            </a:r>
+            <a:r>
+              <a:rPr lang="fr-BE" dirty="0"/>
+              <a:t> Bisconti</a:t>
+            </a:r>
+          </a:p>
+        </p:txBody>
+      </p:sp>
+      <p:sp>
+        <p:nvSpPr>
+          <p:cNvPr id="4" name="Espace réservé du contenu 3">
+            <a:extLst>
+              <a:ext uri="{FF2B5EF4-FFF2-40B4-BE49-F238E27FC236}">
+                <a16:creationId xmlns:a16="http://schemas.microsoft.com/office/drawing/2014/main" id="{711EAB25-4ADE-4445-8633-85D4187A6561}"/>
+              </a:ext>
+            </a:extLst>
+          </p:cNvPr>
+          <p:cNvSpPr>
+            <a:spLocks noGrp="1"/>
+          </p:cNvSpPr>
+          <p:nvPr>
+            <p:ph sz="half" idx="2"/>
+          </p:nvPr>
+        </p:nvSpPr>
+        <p:spPr>
+          <a:xfrm>
+            <a:off x="1141412" y="2338614"/>
+            <a:ext cx="3195914" cy="3833585"/>
+          </a:xfrm>
+        </p:spPr>
+        <p:txBody>
+          <a:bodyPr>
+            <a:normAutofit/>
+          </a:bodyPr>
+          <a:lstStyle/>
+          <a:p>
+            <a:r>
+              <a:rPr lang="fr-BE" sz="1800" dirty="0" err="1"/>
+              <a:t>Devised</a:t>
+            </a:r>
+            <a:r>
+              <a:rPr lang="fr-BE" sz="1800" dirty="0"/>
+              <a:t> an application for the first time</a:t>
+            </a:r>
+          </a:p>
+          <a:p>
+            <a:r>
+              <a:rPr lang="fr-BE" sz="1800" dirty="0" err="1"/>
+              <a:t>Took</a:t>
+            </a:r>
+            <a:r>
+              <a:rPr lang="fr-BE" sz="1800" dirty="0"/>
+              <a:t> </a:t>
+            </a:r>
+            <a:r>
+              <a:rPr lang="fr-BE" sz="1800" dirty="0" err="1"/>
+              <a:t>pleasure</a:t>
+            </a:r>
+            <a:r>
+              <a:rPr lang="fr-BE" sz="1800" dirty="0"/>
+              <a:t> in </a:t>
+            </a:r>
+            <a:r>
+              <a:rPr lang="fr-BE" sz="1800" dirty="0" err="1"/>
+              <a:t>programming</a:t>
+            </a:r>
+            <a:endParaRPr lang="fr-BE" sz="1800" dirty="0"/>
+          </a:p>
+          <a:p>
+            <a:endParaRPr lang="fr-BE" sz="1800" dirty="0"/>
+          </a:p>
+          <a:p>
+            <a:r>
+              <a:rPr lang="fr-BE" sz="1800" dirty="0" err="1"/>
+              <a:t>Learned</a:t>
+            </a:r>
+            <a:r>
+              <a:rPr lang="fr-BE" sz="1800" dirty="0"/>
+              <a:t> how to focus on one issue at a time</a:t>
+            </a:r>
+          </a:p>
+          <a:p>
+            <a:endParaRPr lang="fr-BE" sz="1800" dirty="0"/>
+          </a:p>
+          <a:p>
+            <a:endParaRPr lang="fr-BE" sz="1000" dirty="0"/>
+          </a:p>
+          <a:p>
+            <a:endParaRPr lang="fr-BE" sz="1800" dirty="0"/>
+          </a:p>
+          <a:p>
+            <a:endParaRPr lang="fr-BE" sz="1800" dirty="0"/>
+          </a:p>
+        </p:txBody>
+      </p:sp>
+      <p:sp>
+        <p:nvSpPr>
+          <p:cNvPr id="5" name="Espace réservé du texte 4">
+            <a:extLst>
+              <a:ext uri="{FF2B5EF4-FFF2-40B4-BE49-F238E27FC236}">
+                <a16:creationId xmlns:a16="http://schemas.microsoft.com/office/drawing/2014/main" id="{0C82FBF4-B232-4869-A0B9-CC460A91D5DF}"/>
+              </a:ext>
+            </a:extLst>
+          </p:cNvPr>
+          <p:cNvSpPr>
+            <a:spLocks noGrp="1"/>
+          </p:cNvSpPr>
+          <p:nvPr>
+            <p:ph type="body" sz="quarter" idx="3"/>
+          </p:nvPr>
+        </p:nvSpPr>
+        <p:spPr>
+          <a:xfrm>
+            <a:off x="4655586" y="1522185"/>
+            <a:ext cx="2784004" cy="816429"/>
+          </a:xfrm>
+        </p:spPr>
+        <p:txBody>
+          <a:bodyPr/>
+          <a:lstStyle/>
+          <a:p>
+            <a:r>
+              <a:rPr lang="fr-BE" dirty="0"/>
+              <a:t>Quentin </a:t>
+            </a:r>
+            <a:r>
+              <a:rPr lang="fr-BE" dirty="0" err="1"/>
+              <a:t>Zaretti</a:t>
+            </a:r>
+            <a:endParaRPr lang="fr-BE" dirty="0"/>
+          </a:p>
+        </p:txBody>
+      </p:sp>
+      <p:sp>
+        <p:nvSpPr>
+          <p:cNvPr id="6" name="Espace réservé du contenu 5">
+            <a:extLst>
+              <a:ext uri="{FF2B5EF4-FFF2-40B4-BE49-F238E27FC236}">
+                <a16:creationId xmlns:a16="http://schemas.microsoft.com/office/drawing/2014/main" id="{72A85B2C-4AE9-487D-BA8F-5BC97E25AB72}"/>
+              </a:ext>
+            </a:extLst>
+          </p:cNvPr>
+          <p:cNvSpPr>
+            <a:spLocks noGrp="1"/>
+          </p:cNvSpPr>
+          <p:nvPr>
+            <p:ph sz="quarter" idx="4"/>
+          </p:nvPr>
+        </p:nvSpPr>
+        <p:spPr>
+          <a:xfrm>
+            <a:off x="7868540" y="2338614"/>
+            <a:ext cx="3195913" cy="3759199"/>
+          </a:xfrm>
+        </p:spPr>
+        <p:txBody>
+          <a:bodyPr/>
+          <a:lstStyle/>
+          <a:p>
+            <a:endParaRPr lang="fr-BE" dirty="0"/>
+          </a:p>
+        </p:txBody>
+      </p:sp>
+      <p:sp>
+        <p:nvSpPr>
+          <p:cNvPr id="7" name="Espace réservé du texte 4">
+            <a:extLst>
+              <a:ext uri="{FF2B5EF4-FFF2-40B4-BE49-F238E27FC236}">
+                <a16:creationId xmlns:a16="http://schemas.microsoft.com/office/drawing/2014/main" id="{8946F920-A735-45D9-AB65-C5BE09E681D8}"/>
+              </a:ext>
+            </a:extLst>
+          </p:cNvPr>
+          <p:cNvSpPr txBox="1">
+            <a:spLocks/>
+          </p:cNvSpPr>
+          <p:nvPr/>
+        </p:nvSpPr>
+        <p:spPr>
+          <a:xfrm>
+            <a:off x="7822604" y="1547585"/>
+            <a:ext cx="3224808" cy="816429"/>
+          </a:xfrm>
+          <a:prstGeom prst="rect">
+            <a:avLst/>
+          </a:prstGeom>
+        </p:spPr>
+        <p:txBody>
+          <a:bodyPr vert="horz" lIns="121899" tIns="60949" rIns="121899" bIns="60949" rtlCol="0" anchor="ctr">
+            <a:normAutofit/>
+          </a:bodyPr>
+          <a:lstStyle>
+            <a:lvl1pPr marL="0" indent="0" algn="l" defTabSz="1218987" rtl="0" eaLnBrk="1" latinLnBrk="0" hangingPunct="1">
+              <a:lnSpc>
+                <a:spcPct val="90000"/>
+              </a:lnSpc>
+              <a:spcBef>
+                <a:spcPts val="1800"/>
+              </a:spcBef>
+              <a:buClr>
+                <a:schemeClr val="accent1">
+                  <a:lumMod val="75000"/>
+                </a:schemeClr>
+              </a:buClr>
+              <a:buFont typeface="Arial" pitchFamily="34" charset="0"/>
+              <a:buNone/>
+              <a:defRPr sz="2800" b="0" kern="1200">
+                <a:solidFill>
+                  <a:schemeClr val="accent1">
+                    <a:lumMod val="75000"/>
+                  </a:schemeClr>
+                </a:solidFill>
+                <a:latin typeface="+mn-lt"/>
+                <a:ea typeface="+mn-ea"/>
+                <a:cs typeface="+mn-cs"/>
+              </a:defRPr>
+            </a:lvl1pPr>
+            <a:lvl2pPr marL="609493" indent="0" algn="l" defTabSz="1218987" rtl="0" eaLnBrk="1" latinLnBrk="0" hangingPunct="1">
+              <a:lnSpc>
+                <a:spcPct val="90000"/>
+              </a:lnSpc>
+              <a:spcBef>
+                <a:spcPts val="1200"/>
+              </a:spcBef>
+              <a:buClr>
+                <a:schemeClr val="accent1">
+                  <a:lumMod val="75000"/>
+                </a:schemeClr>
+              </a:buClr>
+              <a:buFont typeface="Arial" pitchFamily="34" charset="0"/>
+              <a:buNone/>
+              <a:defRPr sz="2700" b="1" kern="1200">
+                <a:solidFill>
+                  <a:schemeClr val="tx1"/>
+                </a:solidFill>
+                <a:latin typeface="+mn-lt"/>
+                <a:ea typeface="+mn-ea"/>
+                <a:cs typeface="+mn-cs"/>
+              </a:defRPr>
+            </a:lvl2pPr>
+            <a:lvl3pPr marL="1218987" indent="0" algn="l" defTabSz="1218987" rtl="0" eaLnBrk="1" latinLnBrk="0" hangingPunct="1">
+              <a:lnSpc>
+                <a:spcPct val="90000"/>
+              </a:lnSpc>
+              <a:spcBef>
+                <a:spcPts val="800"/>
+              </a:spcBef>
+              <a:buClr>
+                <a:schemeClr val="accent1">
+                  <a:lumMod val="75000"/>
+                </a:schemeClr>
+              </a:buClr>
+              <a:buFont typeface="Arial" pitchFamily="34" charset="0"/>
+              <a:buNone/>
+              <a:defRPr sz="2400" b="1" kern="1200">
+                <a:solidFill>
+                  <a:schemeClr val="tx1"/>
+                </a:solidFill>
+                <a:latin typeface="+mn-lt"/>
+                <a:ea typeface="+mn-ea"/>
+                <a:cs typeface="+mn-cs"/>
+              </a:defRPr>
+            </a:lvl3pPr>
+            <a:lvl4pPr marL="1828480" indent="0" algn="l" defTabSz="1218987" rtl="0" eaLnBrk="1" latinLnBrk="0" hangingPunct="1">
+              <a:lnSpc>
+                <a:spcPct val="90000"/>
+              </a:lnSpc>
+              <a:spcBef>
+                <a:spcPts val="800"/>
+              </a:spcBef>
+              <a:buClr>
+                <a:schemeClr val="accent1">
+                  <a:lumMod val="75000"/>
+                </a:schemeClr>
+              </a:buClr>
+              <a:buFont typeface="Arial" pitchFamily="34" charset="0"/>
+              <a:buNone/>
+              <a:defRPr sz="2100" b="1" kern="1200">
+                <a:solidFill>
+                  <a:schemeClr val="tx1"/>
+                </a:solidFill>
+                <a:latin typeface="+mn-lt"/>
+                <a:ea typeface="+mn-ea"/>
+                <a:cs typeface="+mn-cs"/>
+              </a:defRPr>
+            </a:lvl4pPr>
+            <a:lvl5pPr marL="2437973" indent="0" algn="l" defTabSz="1218987" rtl="0" eaLnBrk="1" latinLnBrk="0" hangingPunct="1">
+              <a:lnSpc>
+                <a:spcPct val="90000"/>
+              </a:lnSpc>
+              <a:spcBef>
+                <a:spcPts val="800"/>
+              </a:spcBef>
+              <a:buClr>
+                <a:schemeClr val="accent1">
+                  <a:lumMod val="75000"/>
+                </a:schemeClr>
+              </a:buClr>
+              <a:buFont typeface="Arial" pitchFamily="34" charset="0"/>
+              <a:buNone/>
+              <a:defRPr sz="2100" b="1" kern="1200">
+                <a:solidFill>
+                  <a:schemeClr val="tx1"/>
+                </a:solidFill>
+                <a:latin typeface="+mn-lt"/>
+                <a:ea typeface="+mn-ea"/>
+                <a:cs typeface="+mn-cs"/>
+              </a:defRPr>
+            </a:lvl5pPr>
+            <a:lvl6pPr marL="3047467" indent="0" algn="l" defTabSz="1218987" rtl="0" eaLnBrk="1" latinLnBrk="0" hangingPunct="1">
+              <a:lnSpc>
+                <a:spcPct val="90000"/>
+              </a:lnSpc>
+              <a:spcBef>
+                <a:spcPts val="800"/>
+              </a:spcBef>
+              <a:buClr>
+                <a:schemeClr val="accent1"/>
+              </a:buClr>
+              <a:buFont typeface="Arial" pitchFamily="34" charset="0"/>
+              <a:buNone/>
+              <a:defRPr sz="2100" b="1" kern="1200" baseline="0">
+                <a:solidFill>
+                  <a:schemeClr val="tx1"/>
+                </a:solidFill>
+                <a:latin typeface="+mn-lt"/>
+                <a:ea typeface="+mn-ea"/>
+                <a:cs typeface="+mn-cs"/>
+              </a:defRPr>
+            </a:lvl6pPr>
+            <a:lvl7pPr marL="3656960" indent="0" algn="l" defTabSz="1218987" rtl="0" eaLnBrk="1" latinLnBrk="0" hangingPunct="1">
+              <a:lnSpc>
+                <a:spcPct val="90000"/>
+              </a:lnSpc>
+              <a:spcBef>
+                <a:spcPts val="800"/>
+              </a:spcBef>
+              <a:buClr>
+                <a:schemeClr val="accent1"/>
+              </a:buClr>
+              <a:buFont typeface="Arial" pitchFamily="34" charset="0"/>
+              <a:buNone/>
+              <a:defRPr sz="2100" b="1" kern="1200" baseline="0">
+                <a:solidFill>
+                  <a:schemeClr val="tx1"/>
+                </a:solidFill>
+                <a:latin typeface="+mn-lt"/>
+                <a:ea typeface="+mn-ea"/>
+                <a:cs typeface="+mn-cs"/>
+              </a:defRPr>
+            </a:lvl7pPr>
+            <a:lvl8pPr marL="4266453" indent="0" algn="l" defTabSz="1218987" rtl="0" eaLnBrk="1" latinLnBrk="0" hangingPunct="1">
+              <a:lnSpc>
+                <a:spcPct val="90000"/>
+              </a:lnSpc>
+              <a:spcBef>
+                <a:spcPts val="800"/>
+              </a:spcBef>
+              <a:buClr>
+                <a:schemeClr val="accent1"/>
+              </a:buClr>
+              <a:buFont typeface="Arial" pitchFamily="34" charset="0"/>
+              <a:buNone/>
+              <a:defRPr sz="2100" b="1" kern="1200" baseline="0">
+                <a:solidFill>
+                  <a:schemeClr val="tx1"/>
+                </a:solidFill>
+                <a:latin typeface="+mn-lt"/>
+                <a:ea typeface="+mn-ea"/>
+                <a:cs typeface="+mn-cs"/>
+              </a:defRPr>
+            </a:lvl8pPr>
+            <a:lvl9pPr marL="4875947" indent="0" algn="l" defTabSz="1218987" rtl="0" eaLnBrk="1" latinLnBrk="0" hangingPunct="1">
+              <a:lnSpc>
+                <a:spcPct val="90000"/>
+              </a:lnSpc>
+              <a:spcBef>
+                <a:spcPts val="800"/>
+              </a:spcBef>
+              <a:buClr>
+                <a:schemeClr val="accent1"/>
+              </a:buClr>
+              <a:buFont typeface="Arial" pitchFamily="34" charset="0"/>
+              <a:buNone/>
+              <a:defRPr sz="2100" b="1" kern="1200" baseline="0">
+                <a:solidFill>
+                  <a:schemeClr val="tx1"/>
+                </a:solidFill>
+                <a:latin typeface="+mn-lt"/>
+                <a:ea typeface="+mn-ea"/>
+                <a:cs typeface="+mn-cs"/>
+              </a:defRPr>
+            </a:lvl9pPr>
+          </a:lstStyle>
+          <a:p>
+            <a:r>
+              <a:rPr lang="fr-BE" dirty="0"/>
+              <a:t>Nathan Pire</a:t>
+            </a:r>
+          </a:p>
+        </p:txBody>
+      </p:sp>
+      <p:sp>
+        <p:nvSpPr>
+          <p:cNvPr id="11" name="ZoneTexte 10">
+            <a:extLst>
+              <a:ext uri="{FF2B5EF4-FFF2-40B4-BE49-F238E27FC236}">
+                <a16:creationId xmlns:a16="http://schemas.microsoft.com/office/drawing/2014/main" id="{21838E39-BE5B-469F-B9B5-C596D3246986}"/>
+              </a:ext>
+            </a:extLst>
+          </p:cNvPr>
+          <p:cNvSpPr txBox="1"/>
+          <p:nvPr/>
+        </p:nvSpPr>
+        <p:spPr>
+          <a:xfrm>
+            <a:off x="4292802" y="2411185"/>
+            <a:ext cx="3531214" cy="3785652"/>
+          </a:xfrm>
+          <a:prstGeom prst="rect">
+            <a:avLst/>
+          </a:prstGeom>
+          <a:noFill/>
+        </p:spPr>
+        <p:txBody>
+          <a:bodyPr wrap="square" rtlCol="0">
+            <a:spAutoFit/>
+          </a:bodyPr>
+          <a:lstStyle/>
+          <a:p>
+            <a:pPr marL="342900" indent="-342900">
+              <a:buFont typeface="Arial" panose="020B0604020202020204" pitchFamily="34" charset="0"/>
+              <a:buChar char="•"/>
+            </a:pPr>
+            <a:endParaRPr lang="fr-BE" dirty="0"/>
+          </a:p>
+          <a:p>
+            <a:endParaRPr lang="fr-BE" dirty="0"/>
+          </a:p>
+          <a:p>
+            <a:endParaRPr lang="fr-BE" dirty="0"/>
+          </a:p>
+          <a:p>
+            <a:endParaRPr lang="fr-BE" dirty="0"/>
+          </a:p>
+          <a:p>
+            <a:endParaRPr lang="fr-BE" dirty="0"/>
+          </a:p>
+          <a:p>
+            <a:endParaRPr lang="fr-BE" dirty="0"/>
+          </a:p>
+          <a:p>
+            <a:endParaRPr lang="fr-BE" dirty="0"/>
+          </a:p>
+          <a:p>
+            <a:endParaRPr lang="fr-BE" dirty="0"/>
+          </a:p>
+          <a:p>
+            <a:endParaRPr lang="fr-BE" dirty="0"/>
+          </a:p>
+          <a:p>
+            <a:endParaRPr lang="fr-BE" dirty="0"/>
+          </a:p>
+        </p:txBody>
+      </p:sp>
+    </p:spTree>
+    <p:extLst>
+      <p:ext uri="{BB962C8B-B14F-4D97-AF65-F5344CB8AC3E}">
+        <p14:creationId xmlns:p14="http://schemas.microsoft.com/office/powerpoint/2010/main" val="4081864857"/>
       </p:ext>
     </p:extLst>
   </p:cSld>
@@ -10389,6 +11124,17 @@
 </file>
 
 <file path=customXml/item1.xml><?xml version="1.0" encoding="utf-8"?>
+<p:properties xmlns:p="http://schemas.microsoft.com/office/2006/metadata/properties" xmlns:xsi="http://www.w3.org/2001/XMLSchema-instance" xmlns:pc="http://schemas.microsoft.com/office/infopath/2007/PartnerControls">
+  <documentManagement>
+    <VSO_x0020_item_x0020_id xmlns="40262f94-9f35-4ac3-9a90-690165a166b7" xsi:nil="true"/>
+    <Assetid_x0020_ xmlns="40262f94-9f35-4ac3-9a90-690165a166b7" xsi:nil="true"/>
+    <Item_x0020_Details xmlns="40262f94-9f35-4ac3-9a90-690165a166b7" xsi:nil="true"/>
+    <Template_x0020_details xmlns="40262f94-9f35-4ac3-9a90-690165a166b7" xsi:nil="true"/>
+  </documentManagement>
+</p:properties>
+</file>
+
+<file path=customXml/item2.xml><?xml version="1.0" encoding="utf-8"?>
 <ct:contentTypeSchema xmlns:ct="http://schemas.microsoft.com/office/2006/metadata/contentType" xmlns:ma="http://schemas.microsoft.com/office/2006/metadata/properties/metaAttributes" ct:_="" ma:_="" ma:contentTypeName="Document" ma:contentTypeID="0x010100AA3F7D94069FF64A86F7DFF56D60E3BE" ma:contentTypeVersion="6" ma:contentTypeDescription="Create a new document." ma:contentTypeScope="" ma:versionID="c32302c77d4085ecf495bdddb7f5e889">
   <xsd:schema xmlns:xsd="http://www.w3.org/2001/XMLSchema" xmlns:xs="http://www.w3.org/2001/XMLSchema" xmlns:p="http://schemas.microsoft.com/office/2006/metadata/properties" xmlns:ns2="a4f35948-e619-41b3-aa29-22878b09cfd2" xmlns:ns3="40262f94-9f35-4ac3-9a90-690165a166b7" targetNamespace="http://schemas.microsoft.com/office/2006/metadata/properties" ma:root="true" ma:fieldsID="4ab5ae46be95f9d0be6107e8200be7a2" ns2:_="" ns3:_="">
     <xsd:import namespace="a4f35948-e619-41b3-aa29-22878b09cfd2"/>
@@ -10569,17 +11315,6 @@
 </ct:contentTypeSchema>
 </file>
 
-<file path=customXml/item2.xml><?xml version="1.0" encoding="utf-8"?>
-<p:properties xmlns:p="http://schemas.microsoft.com/office/2006/metadata/properties" xmlns:xsi="http://www.w3.org/2001/XMLSchema-instance" xmlns:pc="http://schemas.microsoft.com/office/infopath/2007/PartnerControls">
-  <documentManagement>
-    <VSO_x0020_item_x0020_id xmlns="40262f94-9f35-4ac3-9a90-690165a166b7" xsi:nil="true"/>
-    <Assetid_x0020_ xmlns="40262f94-9f35-4ac3-9a90-690165a166b7" xsi:nil="true"/>
-    <Item_x0020_Details xmlns="40262f94-9f35-4ac3-9a90-690165a166b7" xsi:nil="true"/>
-    <Template_x0020_details xmlns="40262f94-9f35-4ac3-9a90-690165a166b7" xsi:nil="true"/>
-  </documentManagement>
-</p:properties>
-</file>
-
 <file path=customXml/item3.xml><?xml version="1.0" encoding="utf-8"?>
 <?mso-contentType ?>
 <FormTemplates xmlns="http://schemas.microsoft.com/sharepoint/v3/contenttype/forms">
@@ -10590,6 +11325,23 @@
 </file>
 
 <file path=customXml/itemProps1.xml><?xml version="1.0" encoding="utf-8"?>
+<ds:datastoreItem xmlns:ds="http://schemas.openxmlformats.org/officeDocument/2006/customXml" ds:itemID="{5E700CCB-20BA-4760-AB9F-AC3B63ED32E0}">
+  <ds:schemaRefs>
+    <ds:schemaRef ds:uri="http://schemas.microsoft.com/office/2006/metadata/properties"/>
+    <ds:schemaRef ds:uri="http://schemas.microsoft.com/office/2006/documentManagement/types"/>
+    <ds:schemaRef ds:uri="http://purl.org/dc/terms/"/>
+    <ds:schemaRef ds:uri="http://schemas.openxmlformats.org/package/2006/metadata/core-properties"/>
+    <ds:schemaRef ds:uri="http://purl.org/dc/dcmitype/"/>
+    <ds:schemaRef ds:uri="http://schemas.microsoft.com/office/infopath/2007/PartnerControls"/>
+    <ds:schemaRef ds:uri="http://purl.org/dc/elements/1.1/"/>
+    <ds:schemaRef ds:uri="40262f94-9f35-4ac3-9a90-690165a166b7"/>
+    <ds:schemaRef ds:uri="a4f35948-e619-41b3-aa29-22878b09cfd2"/>
+    <ds:schemaRef ds:uri="http://www.w3.org/XML/1998/namespace"/>
+  </ds:schemaRefs>
+</ds:datastoreItem>
+</file>
+
+<file path=customXml/itemProps2.xml><?xml version="1.0" encoding="utf-8"?>
 <ds:datastoreItem xmlns:ds="http://schemas.openxmlformats.org/officeDocument/2006/customXml" ds:itemID="{FB14945D-DABB-422F-9B28-D299995C9226}">
   <ds:schemaRefs>
     <ds:schemaRef ds:uri="http://schemas.microsoft.com/office/2006/metadata/contentType"/>
@@ -10608,23 +11360,6 @@
 </ds:datastoreItem>
 </file>
 
-<file path=customXml/itemProps2.xml><?xml version="1.0" encoding="utf-8"?>
-<ds:datastoreItem xmlns:ds="http://schemas.openxmlformats.org/officeDocument/2006/customXml" ds:itemID="{5E700CCB-20BA-4760-AB9F-AC3B63ED32E0}">
-  <ds:schemaRefs>
-    <ds:schemaRef ds:uri="http://schemas.microsoft.com/office/2006/metadata/properties"/>
-    <ds:schemaRef ds:uri="http://schemas.microsoft.com/office/2006/documentManagement/types"/>
-    <ds:schemaRef ds:uri="http://purl.org/dc/terms/"/>
-    <ds:schemaRef ds:uri="http://schemas.openxmlformats.org/package/2006/metadata/core-properties"/>
-    <ds:schemaRef ds:uri="http://purl.org/dc/dcmitype/"/>
-    <ds:schemaRef ds:uri="http://schemas.microsoft.com/office/infopath/2007/PartnerControls"/>
-    <ds:schemaRef ds:uri="http://purl.org/dc/elements/1.1/"/>
-    <ds:schemaRef ds:uri="40262f94-9f35-4ac3-9a90-690165a166b7"/>
-    <ds:schemaRef ds:uri="a4f35948-e619-41b3-aa29-22878b09cfd2"/>
-    <ds:schemaRef ds:uri="http://www.w3.org/XML/1998/namespace"/>
-  </ds:schemaRefs>
-</ds:datastoreItem>
-</file>
-
 <file path=customXml/itemProps3.xml><?xml version="1.0" encoding="utf-8"?>
 <ds:datastoreItem xmlns:ds="http://schemas.openxmlformats.org/officeDocument/2006/customXml" ds:itemID="{308942AA-0721-4324-BC2C-A3CB43F24E71}">
   <ds:schemaRefs>

</xml_diff>

<commit_message>
Revert "Merge branch 'master' of https://github.com/thelittlewozniak/iKitchen"
This reverts commit e5986a3e30935257a81a6c84fd1bba7970d34544, reversing
changes made to 512390838648f3617f426072134985ab58a29511.
</commit_message>
<xml_diff>
--- a/Fichiers analyse/IKitchen.pptx
+++ b/Fichiers analyse/IKitchen.pptx
@@ -5,10 +5,10 @@
     <p:sldMasterId id="2147483648" r:id="rId4"/>
   </p:sldMasterIdLst>
   <p:notesMasterIdLst>
-    <p:notesMasterId r:id="rId26"/>
+    <p:notesMasterId r:id="rId24"/>
   </p:notesMasterIdLst>
   <p:handoutMasterIdLst>
-    <p:handoutMasterId r:id="rId27"/>
+    <p:handoutMasterId r:id="rId25"/>
   </p:handoutMasterIdLst>
   <p:sldIdLst>
     <p:sldId id="256" r:id="rId5"/>
@@ -30,8 +30,6 @@
     <p:sldId id="276" r:id="rId21"/>
     <p:sldId id="278" r:id="rId22"/>
     <p:sldId id="283" r:id="rId23"/>
-    <p:sldId id="285" r:id="rId24"/>
-    <p:sldId id="286" r:id="rId25"/>
   </p:sldIdLst>
   <p:sldSz cx="12188825" cy="6858000"/>
   <p:notesSz cx="6858000" cy="9144000"/>
@@ -247,7 +245,7 @@
             <a:pPr rtl="0"/>
             <a:fld id="{439A2291-0035-4D64-A7A5-F36AC1AF399D}" type="datetime1">
               <a:rPr lang="fr-FR" smtClean="0"/>
-              <a:t>21/05/2018</a:t>
+              <a:t>19/05/2018</a:t>
             </a:fld>
             <a:endParaRPr lang="fr-FR" dirty="0"/>
           </a:p>
@@ -417,7 +415,7 @@
             <a:pPr rtl="0"/>
             <a:fld id="{4419B5CD-CE9D-4F17-8DE3-0045DF2A06F1}" type="datetime1">
               <a:rPr lang="fr-FR" noProof="0" smtClean="0"/>
-              <a:t>21/05/2018</a:t>
+              <a:t>19/05/2018</a:t>
             </a:fld>
             <a:endParaRPr lang="fr-FR" noProof="0" dirty="0"/>
           </a:p>
@@ -1586,7 +1584,7 @@
             <a:pPr rtl="0"/>
             <a:fld id="{FFED7672-6A17-4383-8E11-B703B2F244DD}" type="datetime1">
               <a:rPr lang="fr-FR" noProof="0" smtClean="0"/>
-              <a:t>21/05/2018</a:t>
+              <a:t>19/05/2018</a:t>
             </a:fld>
             <a:endParaRPr lang="fr-FR" noProof="0" dirty="0"/>
           </a:p>
@@ -1791,7 +1789,7 @@
             <a:pPr rtl="0"/>
             <a:fld id="{E1450B91-7D53-40A4-B2F5-AA5E0059FF2C}" type="datetime1">
               <a:rPr lang="fr-FR" noProof="0" smtClean="0"/>
-              <a:t>21/05/2018</a:t>
+              <a:t>19/05/2018</a:t>
             </a:fld>
             <a:endParaRPr lang="fr-FR" noProof="0" dirty="0"/>
           </a:p>
@@ -2345,7 +2343,7 @@
             <a:pPr rtl="0"/>
             <a:fld id="{3B681A6B-7357-4D25-8FC7-B90E847B95A8}" type="datetime1">
               <a:rPr lang="fr-FR" noProof="0" smtClean="0"/>
-              <a:t>21/05/2018</a:t>
+              <a:t>19/05/2018</a:t>
             </a:fld>
             <a:endParaRPr lang="fr-FR" noProof="0" dirty="0"/>
           </a:p>
@@ -2550,7 +2548,7 @@
             <a:pPr rtl="0"/>
             <a:fld id="{80C5A66A-4BD8-442B-B2CE-4DDC3F185A34}" type="datetime1">
               <a:rPr lang="fr-FR" noProof="0" smtClean="0"/>
-              <a:t>21/05/2018</a:t>
+              <a:t>19/05/2018</a:t>
             </a:fld>
             <a:endParaRPr lang="fr-FR" noProof="0" dirty="0"/>
           </a:p>
@@ -3158,7 +3156,7 @@
             <a:pPr rtl="0"/>
             <a:fld id="{70B7FDAA-B5D3-4E22-A82E-02191A2150B9}" type="datetime1">
               <a:rPr lang="fr-FR" noProof="0" smtClean="0"/>
-              <a:t>21/05/2018</a:t>
+              <a:t>19/05/2018</a:t>
             </a:fld>
             <a:endParaRPr lang="fr-FR" noProof="0" dirty="0"/>
           </a:p>
@@ -3474,7 +3472,7 @@
             <a:pPr rtl="0"/>
             <a:fld id="{BADF8559-33F4-416D-A710-49A46B99982C}" type="datetime1">
               <a:rPr lang="fr-FR" noProof="0" smtClean="0"/>
-              <a:t>21/05/2018</a:t>
+              <a:t>19/05/2018</a:t>
             </a:fld>
             <a:endParaRPr lang="fr-FR" noProof="0" dirty="0"/>
           </a:p>
@@ -3940,7 +3938,7 @@
             <a:pPr rtl="0"/>
             <a:fld id="{CF92E5DF-51C7-4012-82D0-A6F20F8A1C3B}" type="datetime1">
               <a:rPr lang="fr-FR" noProof="0" smtClean="0"/>
-              <a:t>21/05/2018</a:t>
+              <a:t>19/05/2018</a:t>
             </a:fld>
             <a:endParaRPr lang="fr-FR" noProof="0" dirty="0"/>
           </a:p>
@@ -4077,7 +4075,7 @@
             <a:pPr rtl="0"/>
             <a:fld id="{A66353DA-E3F6-4188-A918-D5978D2DC352}" type="datetime1">
               <a:rPr lang="fr-FR" noProof="0" smtClean="0"/>
-              <a:t>21/05/2018</a:t>
+              <a:t>19/05/2018</a:t>
             </a:fld>
             <a:endParaRPr lang="fr-FR" noProof="0" dirty="0"/>
           </a:p>
@@ -4373,7 +4371,7 @@
             <a:pPr rtl="0"/>
             <a:fld id="{227CDB5E-87EB-400A-AF0C-7B4E7074CB2E}" type="datetime1">
               <a:rPr lang="fr-FR" noProof="0" smtClean="0"/>
-              <a:t>21/05/2018</a:t>
+              <a:t>19/05/2018</a:t>
             </a:fld>
             <a:endParaRPr lang="fr-FR" noProof="0" dirty="0"/>
           </a:p>
@@ -4676,7 +4674,7 @@
             <a:pPr rtl="0"/>
             <a:fld id="{9B92CBFA-02BE-4A2B-B3DF-CE42DCACD8FF}" type="datetime1">
               <a:rPr lang="fr-FR" noProof="0" smtClean="0"/>
-              <a:t>21/05/2018</a:t>
+              <a:t>19/05/2018</a:t>
             </a:fld>
             <a:endParaRPr lang="fr-FR" noProof="0" dirty="0"/>
           </a:p>
@@ -4965,7 +4963,7 @@
             <a:pPr rtl="0"/>
             <a:fld id="{5B8044B4-8DC2-481B-A751-5605C20AC4B9}" type="datetime1">
               <a:rPr lang="fr-FR" noProof="0" smtClean="0"/>
-              <a:t>21/05/2018</a:t>
+              <a:t>19/05/2018</a:t>
             </a:fld>
             <a:endParaRPr lang="fr-FR" noProof="0" dirty="0"/>
           </a:p>
@@ -5548,7 +5546,7 @@
             <a:pPr rtl="0"/>
             <a:fld id="{01DFB95D-D541-4088-8BCE-2FF8F06A12B2}" type="datetime1">
               <a:rPr lang="fr-FR" noProof="0" smtClean="0"/>
-              <a:t>21/05/2018</a:t>
+              <a:t>19/05/2018</a:t>
             </a:fld>
             <a:endParaRPr lang="fr-FR" noProof="0" dirty="0"/>
           </a:p>
@@ -7430,7 +7428,7 @@
         </p:blipFill>
         <p:spPr>
           <a:xfrm>
-            <a:off x="1057606" y="2416629"/>
+            <a:off x="1485900" y="2306273"/>
             <a:ext cx="3753374" cy="3343742"/>
           </a:xfrm>
           <a:prstGeom prst="rect">
@@ -7452,7 +7450,7 @@
         </p:nvSpPr>
         <p:spPr>
           <a:xfrm>
-            <a:off x="6643999" y="540539"/>
+            <a:off x="6454452" y="1772816"/>
             <a:ext cx="4248473" cy="2520280"/>
           </a:xfrm>
           <a:prstGeom prst="ellipse">
@@ -7512,42 +7510,6 @@
           </a:p>
         </p:txBody>
       </p:sp>
-      <p:pic>
-        <p:nvPicPr>
-          <p:cNvPr id="5" name="Image 4">
-            <a:extLst>
-              <a:ext uri="{FF2B5EF4-FFF2-40B4-BE49-F238E27FC236}">
-                <a16:creationId xmlns:a16="http://schemas.microsoft.com/office/drawing/2014/main" id="{BA8BDA2F-C2C1-48AB-9975-2DE39E173172}"/>
-              </a:ext>
-            </a:extLst>
-          </p:cNvPr>
-          <p:cNvPicPr>
-            <a:picLocks noChangeAspect="1"/>
-          </p:cNvPicPr>
-          <p:nvPr/>
-        </p:nvPicPr>
-        <p:blipFill>
-          <a:blip r:embed="rId3">
-            <a:extLst>
-              <a:ext uri="{28A0092B-C50C-407E-A947-70E740481C1C}">
-                <a14:useLocalDpi xmlns:a14="http://schemas.microsoft.com/office/drawing/2010/main" val="0"/>
-              </a:ext>
-            </a:extLst>
-          </a:blip>
-          <a:stretch>
-            <a:fillRect/>
-          </a:stretch>
-        </p:blipFill>
-        <p:spPr>
-          <a:xfrm>
-            <a:off x="4805920" y="3212746"/>
-            <a:ext cx="7382905" cy="3105583"/>
-          </a:xfrm>
-          <a:prstGeom prst="rect">
-            <a:avLst/>
-          </a:prstGeom>
-        </p:spPr>
-      </p:pic>
     </p:spTree>
     <p:extLst>
       <p:ext uri="{BB962C8B-B14F-4D97-AF65-F5344CB8AC3E}">
@@ -8437,770 +8399,6 @@
     <p:extLst>
       <p:ext uri="{BB962C8B-B14F-4D97-AF65-F5344CB8AC3E}">
         <p14:creationId xmlns:p14="http://schemas.microsoft.com/office/powerpoint/2010/main" val="2041341814"/>
-      </p:ext>
-    </p:extLst>
-  </p:cSld>
-  <p:clrMapOvr>
-    <a:masterClrMapping/>
-  </p:clrMapOvr>
-  <mc:AlternateContent xmlns:mc="http://schemas.openxmlformats.org/markup-compatibility/2006" xmlns:p14="http://schemas.microsoft.com/office/powerpoint/2010/main">
-    <mc:Choice Requires="p14">
-      <p:transition spd="med" p14:dur="700">
-        <p:fade/>
-      </p:transition>
-    </mc:Choice>
-    <mc:Fallback xmlns="">
-      <p:transition spd="med">
-        <p:fade/>
-      </p:transition>
-    </mc:Fallback>
-  </mc:AlternateContent>
-</p:sld>
-</file>
-
-<file path=ppt/slides/slide20.xml><?xml version="1.0" encoding="utf-8"?>
-<p:sld xmlns:a="http://schemas.openxmlformats.org/drawingml/2006/main" xmlns:r="http://schemas.openxmlformats.org/officeDocument/2006/relationships" xmlns:p="http://schemas.openxmlformats.org/presentationml/2006/main">
-  <p:cSld>
-    <p:spTree>
-      <p:nvGrpSpPr>
-        <p:cNvPr id="1" name=""/>
-        <p:cNvGrpSpPr/>
-        <p:nvPr/>
-      </p:nvGrpSpPr>
-      <p:grpSpPr>
-        <a:xfrm>
-          <a:off x="0" y="0"/>
-          <a:ext cx="0" cy="0"/>
-          <a:chOff x="0" y="0"/>
-          <a:chExt cx="0" cy="0"/>
-        </a:xfrm>
-      </p:grpSpPr>
-      <p:sp>
-        <p:nvSpPr>
-          <p:cNvPr id="2" name="Titre 1">
-            <a:extLst>
-              <a:ext uri="{FF2B5EF4-FFF2-40B4-BE49-F238E27FC236}">
-                <a16:creationId xmlns:a16="http://schemas.microsoft.com/office/drawing/2014/main" id="{B43AFA5A-ED24-437F-8675-C9BCC48D2814}"/>
-              </a:ext>
-            </a:extLst>
-          </p:cNvPr>
-          <p:cNvSpPr>
-            <a:spLocks noGrp="1"/>
-          </p:cNvSpPr>
-          <p:nvPr>
-            <p:ph type="title"/>
-          </p:nvPr>
-        </p:nvSpPr>
-        <p:spPr/>
-        <p:txBody>
-          <a:bodyPr/>
-          <a:lstStyle/>
-          <a:p>
-            <a:r>
-              <a:rPr lang="fr-BE" dirty="0"/>
-              <a:t>Conclusions</a:t>
-            </a:r>
-          </a:p>
-        </p:txBody>
-      </p:sp>
-      <p:sp>
-        <p:nvSpPr>
-          <p:cNvPr id="3" name="Espace réservé du texte 2">
-            <a:extLst>
-              <a:ext uri="{FF2B5EF4-FFF2-40B4-BE49-F238E27FC236}">
-                <a16:creationId xmlns:a16="http://schemas.microsoft.com/office/drawing/2014/main" id="{DF704CA3-390A-4E10-8E74-1648D10E72F6}"/>
-              </a:ext>
-            </a:extLst>
-          </p:cNvPr>
-          <p:cNvSpPr>
-            <a:spLocks noGrp="1"/>
-          </p:cNvSpPr>
-          <p:nvPr>
-            <p:ph type="body" idx="1"/>
-          </p:nvPr>
-        </p:nvSpPr>
-        <p:spPr/>
-        <p:txBody>
-          <a:bodyPr/>
-          <a:lstStyle/>
-          <a:p>
-            <a:r>
-              <a:rPr lang="fr-BE" dirty="0" err="1"/>
-              <a:t>What</a:t>
-            </a:r>
-            <a:r>
-              <a:rPr lang="fr-BE" dirty="0"/>
-              <a:t> are </a:t>
-            </a:r>
-            <a:r>
-              <a:rPr lang="fr-BE" dirty="0" err="1"/>
-              <a:t>our</a:t>
-            </a:r>
-            <a:r>
-              <a:rPr lang="fr-BE" dirty="0"/>
-              <a:t> </a:t>
-            </a:r>
-            <a:r>
-              <a:rPr lang="fr-BE" dirty="0" err="1"/>
-              <a:t>thoughts</a:t>
-            </a:r>
-            <a:r>
-              <a:rPr lang="fr-BE" dirty="0"/>
-              <a:t> about </a:t>
-            </a:r>
-            <a:r>
-              <a:rPr lang="fr-BE" dirty="0" err="1"/>
-              <a:t>this</a:t>
-            </a:r>
-            <a:r>
-              <a:rPr lang="fr-BE" dirty="0"/>
-              <a:t> </a:t>
-            </a:r>
-            <a:r>
-              <a:rPr lang="fr-BE" dirty="0" err="1"/>
-              <a:t>project</a:t>
-            </a:r>
-            <a:r>
-              <a:rPr lang="fr-BE" dirty="0"/>
-              <a:t> ?</a:t>
-            </a:r>
-          </a:p>
-        </p:txBody>
-      </p:sp>
-    </p:spTree>
-    <p:extLst>
-      <p:ext uri="{BB962C8B-B14F-4D97-AF65-F5344CB8AC3E}">
-        <p14:creationId xmlns:p14="http://schemas.microsoft.com/office/powerpoint/2010/main" val="2810083180"/>
-      </p:ext>
-    </p:extLst>
-  </p:cSld>
-  <p:clrMapOvr>
-    <a:masterClrMapping/>
-  </p:clrMapOvr>
-  <mc:AlternateContent xmlns:mc="http://schemas.openxmlformats.org/markup-compatibility/2006" xmlns:p14="http://schemas.microsoft.com/office/powerpoint/2010/main">
-    <mc:Choice Requires="p14">
-      <p:transition spd="med" p14:dur="700">
-        <p:fade/>
-      </p:transition>
-    </mc:Choice>
-    <mc:Fallback xmlns="">
-      <p:transition spd="med">
-        <p:fade/>
-      </p:transition>
-    </mc:Fallback>
-  </mc:AlternateContent>
-</p:sld>
-</file>
-
-<file path=ppt/slides/slide21.xml><?xml version="1.0" encoding="utf-8"?>
-<p:sld xmlns:a="http://schemas.openxmlformats.org/drawingml/2006/main" xmlns:r="http://schemas.openxmlformats.org/officeDocument/2006/relationships" xmlns:p="http://schemas.openxmlformats.org/presentationml/2006/main">
-  <p:cSld>
-    <p:spTree>
-      <p:nvGrpSpPr>
-        <p:cNvPr id="1" name=""/>
-        <p:cNvGrpSpPr/>
-        <p:nvPr/>
-      </p:nvGrpSpPr>
-      <p:grpSpPr>
-        <a:xfrm>
-          <a:off x="0" y="0"/>
-          <a:ext cx="0" cy="0"/>
-          <a:chOff x="0" y="0"/>
-          <a:chExt cx="0" cy="0"/>
-        </a:xfrm>
-      </p:grpSpPr>
-      <p:sp>
-        <p:nvSpPr>
-          <p:cNvPr id="2" name="Titre 1">
-            <a:extLst>
-              <a:ext uri="{FF2B5EF4-FFF2-40B4-BE49-F238E27FC236}">
-                <a16:creationId xmlns:a16="http://schemas.microsoft.com/office/drawing/2014/main" id="{5109000C-F2A5-4981-9FD6-53BC3D3C3387}"/>
-              </a:ext>
-            </a:extLst>
-          </p:cNvPr>
-          <p:cNvSpPr>
-            <a:spLocks noGrp="1"/>
-          </p:cNvSpPr>
-          <p:nvPr>
-            <p:ph type="title"/>
-          </p:nvPr>
-        </p:nvSpPr>
-        <p:spPr/>
-        <p:txBody>
-          <a:bodyPr/>
-          <a:lstStyle/>
-          <a:p>
-            <a:r>
-              <a:rPr lang="fr-BE" dirty="0"/>
-              <a:t>Conclusions</a:t>
-            </a:r>
-          </a:p>
-        </p:txBody>
-      </p:sp>
-      <p:sp>
-        <p:nvSpPr>
-          <p:cNvPr id="3" name="Espace réservé du texte 2">
-            <a:extLst>
-              <a:ext uri="{FF2B5EF4-FFF2-40B4-BE49-F238E27FC236}">
-                <a16:creationId xmlns:a16="http://schemas.microsoft.com/office/drawing/2014/main" id="{87CD1E14-1038-45A3-955B-6A9CDDE02F9E}"/>
-              </a:ext>
-            </a:extLst>
-          </p:cNvPr>
-          <p:cNvSpPr>
-            <a:spLocks noGrp="1"/>
-          </p:cNvSpPr>
-          <p:nvPr>
-            <p:ph type="body" idx="1"/>
-          </p:nvPr>
-        </p:nvSpPr>
-        <p:spPr>
-          <a:xfrm>
-            <a:off x="1141412" y="1524000"/>
-            <a:ext cx="2720752" cy="816429"/>
-          </a:xfrm>
-        </p:spPr>
-        <p:txBody>
-          <a:bodyPr/>
-          <a:lstStyle/>
-          <a:p>
-            <a:r>
-              <a:rPr lang="fr-BE" dirty="0" err="1"/>
-              <a:t>Flavian</a:t>
-            </a:r>
-            <a:r>
-              <a:rPr lang="fr-BE" dirty="0"/>
-              <a:t> Bisconti</a:t>
-            </a:r>
-          </a:p>
-        </p:txBody>
-      </p:sp>
-      <p:sp>
-        <p:nvSpPr>
-          <p:cNvPr id="4" name="Espace réservé du contenu 3">
-            <a:extLst>
-              <a:ext uri="{FF2B5EF4-FFF2-40B4-BE49-F238E27FC236}">
-                <a16:creationId xmlns:a16="http://schemas.microsoft.com/office/drawing/2014/main" id="{711EAB25-4ADE-4445-8633-85D4187A6561}"/>
-              </a:ext>
-            </a:extLst>
-          </p:cNvPr>
-          <p:cNvSpPr>
-            <a:spLocks noGrp="1"/>
-          </p:cNvSpPr>
-          <p:nvPr>
-            <p:ph sz="half" idx="2"/>
-          </p:nvPr>
-        </p:nvSpPr>
-        <p:spPr>
-          <a:xfrm>
-            <a:off x="1141412" y="2338614"/>
-            <a:ext cx="3195914" cy="3833585"/>
-          </a:xfrm>
-        </p:spPr>
-        <p:txBody>
-          <a:bodyPr>
-            <a:normAutofit/>
-          </a:bodyPr>
-          <a:lstStyle/>
-          <a:p>
-            <a:r>
-              <a:rPr lang="fr-BE" sz="1800" dirty="0" err="1"/>
-              <a:t>Devised</a:t>
-            </a:r>
-            <a:r>
-              <a:rPr lang="fr-BE" sz="1800" dirty="0"/>
-              <a:t> an application for the first time</a:t>
-            </a:r>
-          </a:p>
-          <a:p>
-            <a:r>
-              <a:rPr lang="fr-BE" sz="1800" dirty="0" err="1"/>
-              <a:t>Took</a:t>
-            </a:r>
-            <a:r>
-              <a:rPr lang="fr-BE" sz="1800" dirty="0"/>
-              <a:t> </a:t>
-            </a:r>
-            <a:r>
-              <a:rPr lang="fr-BE" sz="1800" dirty="0" err="1"/>
-              <a:t>pleasure</a:t>
-            </a:r>
-            <a:r>
-              <a:rPr lang="fr-BE" sz="1800" dirty="0"/>
-              <a:t> in </a:t>
-            </a:r>
-            <a:r>
-              <a:rPr lang="fr-BE" sz="1800" dirty="0" err="1"/>
-              <a:t>programming</a:t>
-            </a:r>
-            <a:endParaRPr lang="fr-BE" sz="1800" dirty="0"/>
-          </a:p>
-          <a:p>
-            <a:r>
-              <a:rPr lang="fr-BE" sz="1800" dirty="0" err="1"/>
-              <a:t>Used</a:t>
-            </a:r>
-            <a:r>
-              <a:rPr lang="fr-BE" sz="1800" dirty="0"/>
-              <a:t> and </a:t>
-            </a:r>
-            <a:r>
-              <a:rPr lang="fr-BE" sz="1800" dirty="0" err="1"/>
-              <a:t>improved</a:t>
-            </a:r>
-            <a:r>
-              <a:rPr lang="fr-BE" sz="1800" dirty="0"/>
-              <a:t> </a:t>
-            </a:r>
-            <a:r>
-              <a:rPr lang="fr-BE" sz="1800" dirty="0" err="1"/>
-              <a:t>skills</a:t>
-            </a:r>
-            <a:r>
-              <a:rPr lang="fr-BE" sz="1800" dirty="0"/>
-              <a:t> </a:t>
-            </a:r>
-            <a:r>
-              <a:rPr lang="fr-BE" sz="1800" dirty="0" err="1"/>
-              <a:t>from</a:t>
-            </a:r>
-            <a:r>
-              <a:rPr lang="fr-BE" sz="1800" dirty="0"/>
-              <a:t> </a:t>
-            </a:r>
-            <a:r>
-              <a:rPr lang="fr-BE" sz="1800" dirty="0" err="1"/>
-              <a:t>secondary</a:t>
-            </a:r>
-            <a:r>
-              <a:rPr lang="fr-BE" sz="1800" dirty="0"/>
-              <a:t> </a:t>
-            </a:r>
-            <a:r>
-              <a:rPr lang="fr-BE" sz="1800" dirty="0" err="1"/>
-              <a:t>school</a:t>
-            </a:r>
-            <a:endParaRPr lang="fr-BE" sz="1800" dirty="0"/>
-          </a:p>
-          <a:p>
-            <a:r>
-              <a:rPr lang="fr-BE" sz="1800" dirty="0" err="1"/>
-              <a:t>Strenghtened</a:t>
-            </a:r>
-            <a:r>
-              <a:rPr lang="fr-BE" sz="1800" dirty="0"/>
-              <a:t> </a:t>
-            </a:r>
-            <a:r>
-              <a:rPr lang="fr-BE" sz="1800" dirty="0" err="1"/>
-              <a:t>teamwork</a:t>
-            </a:r>
-            <a:r>
-              <a:rPr lang="fr-BE" sz="1800" dirty="0"/>
-              <a:t> </a:t>
-            </a:r>
-            <a:r>
-              <a:rPr lang="fr-BE" sz="1800" dirty="0" err="1"/>
-              <a:t>capabilities</a:t>
-            </a:r>
-            <a:endParaRPr lang="fr-BE" sz="1800" dirty="0"/>
-          </a:p>
-          <a:p>
-            <a:r>
-              <a:rPr lang="fr-BE" sz="1800" dirty="0" err="1"/>
-              <a:t>Learned</a:t>
-            </a:r>
-            <a:r>
-              <a:rPr lang="fr-BE" sz="1800" dirty="0"/>
-              <a:t> how to focus on one issue at a time</a:t>
-            </a:r>
-          </a:p>
-          <a:p>
-            <a:endParaRPr lang="fr-BE" sz="1800" dirty="0"/>
-          </a:p>
-          <a:p>
-            <a:endParaRPr lang="fr-BE" sz="1000" dirty="0"/>
-          </a:p>
-          <a:p>
-            <a:endParaRPr lang="fr-BE" sz="1800" dirty="0"/>
-          </a:p>
-          <a:p>
-            <a:endParaRPr lang="fr-BE" sz="1800" dirty="0"/>
-          </a:p>
-        </p:txBody>
-      </p:sp>
-      <p:sp>
-        <p:nvSpPr>
-          <p:cNvPr id="5" name="Espace réservé du texte 4">
-            <a:extLst>
-              <a:ext uri="{FF2B5EF4-FFF2-40B4-BE49-F238E27FC236}">
-                <a16:creationId xmlns:a16="http://schemas.microsoft.com/office/drawing/2014/main" id="{0C82FBF4-B232-4869-A0B9-CC460A91D5DF}"/>
-              </a:ext>
-            </a:extLst>
-          </p:cNvPr>
-          <p:cNvSpPr>
-            <a:spLocks noGrp="1"/>
-          </p:cNvSpPr>
-          <p:nvPr>
-            <p:ph type="body" sz="quarter" idx="3"/>
-          </p:nvPr>
-        </p:nvSpPr>
-        <p:spPr>
-          <a:xfrm>
-            <a:off x="4655586" y="1522185"/>
-            <a:ext cx="2784004" cy="816429"/>
-          </a:xfrm>
-        </p:spPr>
-        <p:txBody>
-          <a:bodyPr/>
-          <a:lstStyle/>
-          <a:p>
-            <a:r>
-              <a:rPr lang="fr-BE" dirty="0"/>
-              <a:t>Quentin </a:t>
-            </a:r>
-            <a:r>
-              <a:rPr lang="fr-BE" dirty="0" err="1"/>
-              <a:t>Zaretti</a:t>
-            </a:r>
-            <a:endParaRPr lang="fr-BE" dirty="0"/>
-          </a:p>
-        </p:txBody>
-      </p:sp>
-      <p:sp>
-        <p:nvSpPr>
-          <p:cNvPr id="6" name="Espace réservé du contenu 5">
-            <a:extLst>
-              <a:ext uri="{FF2B5EF4-FFF2-40B4-BE49-F238E27FC236}">
-                <a16:creationId xmlns:a16="http://schemas.microsoft.com/office/drawing/2014/main" id="{72A85B2C-4AE9-487D-BA8F-5BC97E25AB72}"/>
-              </a:ext>
-            </a:extLst>
-          </p:cNvPr>
-          <p:cNvSpPr>
-            <a:spLocks noGrp="1"/>
-          </p:cNvSpPr>
-          <p:nvPr>
-            <p:ph sz="quarter" idx="4"/>
-          </p:nvPr>
-        </p:nvSpPr>
-        <p:spPr>
-          <a:xfrm>
-            <a:off x="7868540" y="2338614"/>
-            <a:ext cx="3195913" cy="3759199"/>
-          </a:xfrm>
-        </p:spPr>
-        <p:txBody>
-          <a:bodyPr/>
-          <a:lstStyle/>
-          <a:p>
-            <a:endParaRPr lang="fr-BE" dirty="0"/>
-          </a:p>
-        </p:txBody>
-      </p:sp>
-      <p:sp>
-        <p:nvSpPr>
-          <p:cNvPr id="7" name="Espace réservé du texte 4">
-            <a:extLst>
-              <a:ext uri="{FF2B5EF4-FFF2-40B4-BE49-F238E27FC236}">
-                <a16:creationId xmlns:a16="http://schemas.microsoft.com/office/drawing/2014/main" id="{8946F920-A735-45D9-AB65-C5BE09E681D8}"/>
-              </a:ext>
-            </a:extLst>
-          </p:cNvPr>
-          <p:cNvSpPr txBox="1">
-            <a:spLocks/>
-          </p:cNvSpPr>
-          <p:nvPr/>
-        </p:nvSpPr>
-        <p:spPr>
-          <a:xfrm>
-            <a:off x="7822604" y="1547585"/>
-            <a:ext cx="3224808" cy="816429"/>
-          </a:xfrm>
-          <a:prstGeom prst="rect">
-            <a:avLst/>
-          </a:prstGeom>
-        </p:spPr>
-        <p:txBody>
-          <a:bodyPr vert="horz" lIns="121899" tIns="60949" rIns="121899" bIns="60949" rtlCol="0" anchor="ctr">
-            <a:normAutofit/>
-          </a:bodyPr>
-          <a:lstStyle>
-            <a:lvl1pPr marL="0" indent="0" algn="l" defTabSz="1218987" rtl="0" eaLnBrk="1" latinLnBrk="0" hangingPunct="1">
-              <a:lnSpc>
-                <a:spcPct val="90000"/>
-              </a:lnSpc>
-              <a:spcBef>
-                <a:spcPts val="1800"/>
-              </a:spcBef>
-              <a:buClr>
-                <a:schemeClr val="accent1">
-                  <a:lumMod val="75000"/>
-                </a:schemeClr>
-              </a:buClr>
-              <a:buFont typeface="Arial" pitchFamily="34" charset="0"/>
-              <a:buNone/>
-              <a:defRPr sz="2800" b="0" kern="1200">
-                <a:solidFill>
-                  <a:schemeClr val="accent1">
-                    <a:lumMod val="75000"/>
-                  </a:schemeClr>
-                </a:solidFill>
-                <a:latin typeface="+mn-lt"/>
-                <a:ea typeface="+mn-ea"/>
-                <a:cs typeface="+mn-cs"/>
-              </a:defRPr>
-            </a:lvl1pPr>
-            <a:lvl2pPr marL="609493" indent="0" algn="l" defTabSz="1218987" rtl="0" eaLnBrk="1" latinLnBrk="0" hangingPunct="1">
-              <a:lnSpc>
-                <a:spcPct val="90000"/>
-              </a:lnSpc>
-              <a:spcBef>
-                <a:spcPts val="1200"/>
-              </a:spcBef>
-              <a:buClr>
-                <a:schemeClr val="accent1">
-                  <a:lumMod val="75000"/>
-                </a:schemeClr>
-              </a:buClr>
-              <a:buFont typeface="Arial" pitchFamily="34" charset="0"/>
-              <a:buNone/>
-              <a:defRPr sz="2700" b="1" kern="1200">
-                <a:solidFill>
-                  <a:schemeClr val="tx1"/>
-                </a:solidFill>
-                <a:latin typeface="+mn-lt"/>
-                <a:ea typeface="+mn-ea"/>
-                <a:cs typeface="+mn-cs"/>
-              </a:defRPr>
-            </a:lvl2pPr>
-            <a:lvl3pPr marL="1218987" indent="0" algn="l" defTabSz="1218987" rtl="0" eaLnBrk="1" latinLnBrk="0" hangingPunct="1">
-              <a:lnSpc>
-                <a:spcPct val="90000"/>
-              </a:lnSpc>
-              <a:spcBef>
-                <a:spcPts val="800"/>
-              </a:spcBef>
-              <a:buClr>
-                <a:schemeClr val="accent1">
-                  <a:lumMod val="75000"/>
-                </a:schemeClr>
-              </a:buClr>
-              <a:buFont typeface="Arial" pitchFamily="34" charset="0"/>
-              <a:buNone/>
-              <a:defRPr sz="2400" b="1" kern="1200">
-                <a:solidFill>
-                  <a:schemeClr val="tx1"/>
-                </a:solidFill>
-                <a:latin typeface="+mn-lt"/>
-                <a:ea typeface="+mn-ea"/>
-                <a:cs typeface="+mn-cs"/>
-              </a:defRPr>
-            </a:lvl3pPr>
-            <a:lvl4pPr marL="1828480" indent="0" algn="l" defTabSz="1218987" rtl="0" eaLnBrk="1" latinLnBrk="0" hangingPunct="1">
-              <a:lnSpc>
-                <a:spcPct val="90000"/>
-              </a:lnSpc>
-              <a:spcBef>
-                <a:spcPts val="800"/>
-              </a:spcBef>
-              <a:buClr>
-                <a:schemeClr val="accent1">
-                  <a:lumMod val="75000"/>
-                </a:schemeClr>
-              </a:buClr>
-              <a:buFont typeface="Arial" pitchFamily="34" charset="0"/>
-              <a:buNone/>
-              <a:defRPr sz="2100" b="1" kern="1200">
-                <a:solidFill>
-                  <a:schemeClr val="tx1"/>
-                </a:solidFill>
-                <a:latin typeface="+mn-lt"/>
-                <a:ea typeface="+mn-ea"/>
-                <a:cs typeface="+mn-cs"/>
-              </a:defRPr>
-            </a:lvl4pPr>
-            <a:lvl5pPr marL="2437973" indent="0" algn="l" defTabSz="1218987" rtl="0" eaLnBrk="1" latinLnBrk="0" hangingPunct="1">
-              <a:lnSpc>
-                <a:spcPct val="90000"/>
-              </a:lnSpc>
-              <a:spcBef>
-                <a:spcPts val="800"/>
-              </a:spcBef>
-              <a:buClr>
-                <a:schemeClr val="accent1">
-                  <a:lumMod val="75000"/>
-                </a:schemeClr>
-              </a:buClr>
-              <a:buFont typeface="Arial" pitchFamily="34" charset="0"/>
-              <a:buNone/>
-              <a:defRPr sz="2100" b="1" kern="1200">
-                <a:solidFill>
-                  <a:schemeClr val="tx1"/>
-                </a:solidFill>
-                <a:latin typeface="+mn-lt"/>
-                <a:ea typeface="+mn-ea"/>
-                <a:cs typeface="+mn-cs"/>
-              </a:defRPr>
-            </a:lvl5pPr>
-            <a:lvl6pPr marL="3047467" indent="0" algn="l" defTabSz="1218987" rtl="0" eaLnBrk="1" latinLnBrk="0" hangingPunct="1">
-              <a:lnSpc>
-                <a:spcPct val="90000"/>
-              </a:lnSpc>
-              <a:spcBef>
-                <a:spcPts val="800"/>
-              </a:spcBef>
-              <a:buClr>
-                <a:schemeClr val="accent1"/>
-              </a:buClr>
-              <a:buFont typeface="Arial" pitchFamily="34" charset="0"/>
-              <a:buNone/>
-              <a:defRPr sz="2100" b="1" kern="1200" baseline="0">
-                <a:solidFill>
-                  <a:schemeClr val="tx1"/>
-                </a:solidFill>
-                <a:latin typeface="+mn-lt"/>
-                <a:ea typeface="+mn-ea"/>
-                <a:cs typeface="+mn-cs"/>
-              </a:defRPr>
-            </a:lvl6pPr>
-            <a:lvl7pPr marL="3656960" indent="0" algn="l" defTabSz="1218987" rtl="0" eaLnBrk="1" latinLnBrk="0" hangingPunct="1">
-              <a:lnSpc>
-                <a:spcPct val="90000"/>
-              </a:lnSpc>
-              <a:spcBef>
-                <a:spcPts val="800"/>
-              </a:spcBef>
-              <a:buClr>
-                <a:schemeClr val="accent1"/>
-              </a:buClr>
-              <a:buFont typeface="Arial" pitchFamily="34" charset="0"/>
-              <a:buNone/>
-              <a:defRPr sz="2100" b="1" kern="1200" baseline="0">
-                <a:solidFill>
-                  <a:schemeClr val="tx1"/>
-                </a:solidFill>
-                <a:latin typeface="+mn-lt"/>
-                <a:ea typeface="+mn-ea"/>
-                <a:cs typeface="+mn-cs"/>
-              </a:defRPr>
-            </a:lvl7pPr>
-            <a:lvl8pPr marL="4266453" indent="0" algn="l" defTabSz="1218987" rtl="0" eaLnBrk="1" latinLnBrk="0" hangingPunct="1">
-              <a:lnSpc>
-                <a:spcPct val="90000"/>
-              </a:lnSpc>
-              <a:spcBef>
-                <a:spcPts val="800"/>
-              </a:spcBef>
-              <a:buClr>
-                <a:schemeClr val="accent1"/>
-              </a:buClr>
-              <a:buFont typeface="Arial" pitchFamily="34" charset="0"/>
-              <a:buNone/>
-              <a:defRPr sz="2100" b="1" kern="1200" baseline="0">
-                <a:solidFill>
-                  <a:schemeClr val="tx1"/>
-                </a:solidFill>
-                <a:latin typeface="+mn-lt"/>
-                <a:ea typeface="+mn-ea"/>
-                <a:cs typeface="+mn-cs"/>
-              </a:defRPr>
-            </a:lvl8pPr>
-            <a:lvl9pPr marL="4875947" indent="0" algn="l" defTabSz="1218987" rtl="0" eaLnBrk="1" latinLnBrk="0" hangingPunct="1">
-              <a:lnSpc>
-                <a:spcPct val="90000"/>
-              </a:lnSpc>
-              <a:spcBef>
-                <a:spcPts val="800"/>
-              </a:spcBef>
-              <a:buClr>
-                <a:schemeClr val="accent1"/>
-              </a:buClr>
-              <a:buFont typeface="Arial" pitchFamily="34" charset="0"/>
-              <a:buNone/>
-              <a:defRPr sz="2100" b="1" kern="1200" baseline="0">
-                <a:solidFill>
-                  <a:schemeClr val="tx1"/>
-                </a:solidFill>
-                <a:latin typeface="+mn-lt"/>
-                <a:ea typeface="+mn-ea"/>
-                <a:cs typeface="+mn-cs"/>
-              </a:defRPr>
-            </a:lvl9pPr>
-          </a:lstStyle>
-          <a:p>
-            <a:r>
-              <a:rPr lang="fr-BE" dirty="0"/>
-              <a:t>Nathan Pire</a:t>
-            </a:r>
-          </a:p>
-        </p:txBody>
-      </p:sp>
-      <p:sp>
-        <p:nvSpPr>
-          <p:cNvPr id="11" name="ZoneTexte 10">
-            <a:extLst>
-              <a:ext uri="{FF2B5EF4-FFF2-40B4-BE49-F238E27FC236}">
-                <a16:creationId xmlns:a16="http://schemas.microsoft.com/office/drawing/2014/main" id="{21838E39-BE5B-469F-B9B5-C596D3246986}"/>
-              </a:ext>
-            </a:extLst>
-          </p:cNvPr>
-          <p:cNvSpPr txBox="1"/>
-          <p:nvPr/>
-        </p:nvSpPr>
-        <p:spPr>
-          <a:xfrm>
-            <a:off x="4292802" y="2411185"/>
-            <a:ext cx="3531214" cy="3785652"/>
-          </a:xfrm>
-          <a:prstGeom prst="rect">
-            <a:avLst/>
-          </a:prstGeom>
-          <a:noFill/>
-        </p:spPr>
-        <p:txBody>
-          <a:bodyPr wrap="square" rtlCol="0">
-            <a:spAutoFit/>
-          </a:bodyPr>
-          <a:lstStyle/>
-          <a:p>
-            <a:pPr marL="342900" indent="-342900">
-              <a:buFont typeface="Arial" panose="020B0604020202020204" pitchFamily="34" charset="0"/>
-              <a:buChar char="•"/>
-            </a:pPr>
-            <a:endParaRPr lang="fr-BE" dirty="0"/>
-          </a:p>
-          <a:p>
-            <a:endParaRPr lang="fr-BE" dirty="0"/>
-          </a:p>
-          <a:p>
-            <a:endParaRPr lang="fr-BE" dirty="0"/>
-          </a:p>
-          <a:p>
-            <a:endParaRPr lang="fr-BE" dirty="0"/>
-          </a:p>
-          <a:p>
-            <a:endParaRPr lang="fr-BE" dirty="0"/>
-          </a:p>
-          <a:p>
-            <a:endParaRPr lang="fr-BE" dirty="0"/>
-          </a:p>
-          <a:p>
-            <a:endParaRPr lang="fr-BE" dirty="0"/>
-          </a:p>
-          <a:p>
-            <a:endParaRPr lang="fr-BE" dirty="0"/>
-          </a:p>
-          <a:p>
-            <a:endParaRPr lang="fr-BE" dirty="0"/>
-          </a:p>
-          <a:p>
-            <a:endParaRPr lang="fr-BE" dirty="0"/>
-          </a:p>
-        </p:txBody>
-      </p:sp>
-    </p:spTree>
-    <p:extLst>
-      <p:ext uri="{BB962C8B-B14F-4D97-AF65-F5344CB8AC3E}">
-        <p14:creationId xmlns:p14="http://schemas.microsoft.com/office/powerpoint/2010/main" val="4081864857"/>
       </p:ext>
     </p:extLst>
   </p:cSld>
@@ -11191,17 +10389,6 @@
 </file>
 
 <file path=customXml/item1.xml><?xml version="1.0" encoding="utf-8"?>
-<p:properties xmlns:p="http://schemas.microsoft.com/office/2006/metadata/properties" xmlns:xsi="http://www.w3.org/2001/XMLSchema-instance" xmlns:pc="http://schemas.microsoft.com/office/infopath/2007/PartnerControls">
-  <documentManagement>
-    <VSO_x0020_item_x0020_id xmlns="40262f94-9f35-4ac3-9a90-690165a166b7" xsi:nil="true"/>
-    <Assetid_x0020_ xmlns="40262f94-9f35-4ac3-9a90-690165a166b7" xsi:nil="true"/>
-    <Item_x0020_Details xmlns="40262f94-9f35-4ac3-9a90-690165a166b7" xsi:nil="true"/>
-    <Template_x0020_details xmlns="40262f94-9f35-4ac3-9a90-690165a166b7" xsi:nil="true"/>
-  </documentManagement>
-</p:properties>
-</file>
-
-<file path=customXml/item2.xml><?xml version="1.0" encoding="utf-8"?>
 <ct:contentTypeSchema xmlns:ct="http://schemas.microsoft.com/office/2006/metadata/contentType" xmlns:ma="http://schemas.microsoft.com/office/2006/metadata/properties/metaAttributes" ct:_="" ma:_="" ma:contentTypeName="Document" ma:contentTypeID="0x010100AA3F7D94069FF64A86F7DFF56D60E3BE" ma:contentTypeVersion="6" ma:contentTypeDescription="Create a new document." ma:contentTypeScope="" ma:versionID="c32302c77d4085ecf495bdddb7f5e889">
   <xsd:schema xmlns:xsd="http://www.w3.org/2001/XMLSchema" xmlns:xs="http://www.w3.org/2001/XMLSchema" xmlns:p="http://schemas.microsoft.com/office/2006/metadata/properties" xmlns:ns2="a4f35948-e619-41b3-aa29-22878b09cfd2" xmlns:ns3="40262f94-9f35-4ac3-9a90-690165a166b7" targetNamespace="http://schemas.microsoft.com/office/2006/metadata/properties" ma:root="true" ma:fieldsID="4ab5ae46be95f9d0be6107e8200be7a2" ns2:_="" ns3:_="">
     <xsd:import namespace="a4f35948-e619-41b3-aa29-22878b09cfd2"/>
@@ -11382,6 +10569,17 @@
 </ct:contentTypeSchema>
 </file>
 
+<file path=customXml/item2.xml><?xml version="1.0" encoding="utf-8"?>
+<p:properties xmlns:p="http://schemas.microsoft.com/office/2006/metadata/properties" xmlns:xsi="http://www.w3.org/2001/XMLSchema-instance" xmlns:pc="http://schemas.microsoft.com/office/infopath/2007/PartnerControls">
+  <documentManagement>
+    <VSO_x0020_item_x0020_id xmlns="40262f94-9f35-4ac3-9a90-690165a166b7" xsi:nil="true"/>
+    <Assetid_x0020_ xmlns="40262f94-9f35-4ac3-9a90-690165a166b7" xsi:nil="true"/>
+    <Item_x0020_Details xmlns="40262f94-9f35-4ac3-9a90-690165a166b7" xsi:nil="true"/>
+    <Template_x0020_details xmlns="40262f94-9f35-4ac3-9a90-690165a166b7" xsi:nil="true"/>
+  </documentManagement>
+</p:properties>
+</file>
+
 <file path=customXml/item3.xml><?xml version="1.0" encoding="utf-8"?>
 <?mso-contentType ?>
 <FormTemplates xmlns="http://schemas.microsoft.com/sharepoint/v3/contenttype/forms">
@@ -11392,23 +10590,6 @@
 </file>
 
 <file path=customXml/itemProps1.xml><?xml version="1.0" encoding="utf-8"?>
-<ds:datastoreItem xmlns:ds="http://schemas.openxmlformats.org/officeDocument/2006/customXml" ds:itemID="{5E700CCB-20BA-4760-AB9F-AC3B63ED32E0}">
-  <ds:schemaRefs>
-    <ds:schemaRef ds:uri="http://schemas.microsoft.com/office/2006/metadata/properties"/>
-    <ds:schemaRef ds:uri="http://schemas.microsoft.com/office/2006/documentManagement/types"/>
-    <ds:schemaRef ds:uri="http://purl.org/dc/terms/"/>
-    <ds:schemaRef ds:uri="http://schemas.openxmlformats.org/package/2006/metadata/core-properties"/>
-    <ds:schemaRef ds:uri="http://purl.org/dc/dcmitype/"/>
-    <ds:schemaRef ds:uri="http://schemas.microsoft.com/office/infopath/2007/PartnerControls"/>
-    <ds:schemaRef ds:uri="http://purl.org/dc/elements/1.1/"/>
-    <ds:schemaRef ds:uri="40262f94-9f35-4ac3-9a90-690165a166b7"/>
-    <ds:schemaRef ds:uri="a4f35948-e619-41b3-aa29-22878b09cfd2"/>
-    <ds:schemaRef ds:uri="http://www.w3.org/XML/1998/namespace"/>
-  </ds:schemaRefs>
-</ds:datastoreItem>
-</file>
-
-<file path=customXml/itemProps2.xml><?xml version="1.0" encoding="utf-8"?>
 <ds:datastoreItem xmlns:ds="http://schemas.openxmlformats.org/officeDocument/2006/customXml" ds:itemID="{FB14945D-DABB-422F-9B28-D299995C9226}">
   <ds:schemaRefs>
     <ds:schemaRef ds:uri="http://schemas.microsoft.com/office/2006/metadata/contentType"/>
@@ -11427,6 +10608,23 @@
 </ds:datastoreItem>
 </file>
 
+<file path=customXml/itemProps2.xml><?xml version="1.0" encoding="utf-8"?>
+<ds:datastoreItem xmlns:ds="http://schemas.openxmlformats.org/officeDocument/2006/customXml" ds:itemID="{5E700CCB-20BA-4760-AB9F-AC3B63ED32E0}">
+  <ds:schemaRefs>
+    <ds:schemaRef ds:uri="http://schemas.microsoft.com/office/2006/metadata/properties"/>
+    <ds:schemaRef ds:uri="http://schemas.microsoft.com/office/2006/documentManagement/types"/>
+    <ds:schemaRef ds:uri="http://purl.org/dc/terms/"/>
+    <ds:schemaRef ds:uri="http://schemas.openxmlformats.org/package/2006/metadata/core-properties"/>
+    <ds:schemaRef ds:uri="http://purl.org/dc/dcmitype/"/>
+    <ds:schemaRef ds:uri="http://schemas.microsoft.com/office/infopath/2007/PartnerControls"/>
+    <ds:schemaRef ds:uri="http://purl.org/dc/elements/1.1/"/>
+    <ds:schemaRef ds:uri="40262f94-9f35-4ac3-9a90-690165a166b7"/>
+    <ds:schemaRef ds:uri="a4f35948-e619-41b3-aa29-22878b09cfd2"/>
+    <ds:schemaRef ds:uri="http://www.w3.org/XML/1998/namespace"/>
+  </ds:schemaRefs>
+</ds:datastoreItem>
+</file>
+
 <file path=customXml/itemProps3.xml><?xml version="1.0" encoding="utf-8"?>
 <ds:datastoreItem xmlns:ds="http://schemas.openxmlformats.org/officeDocument/2006/customXml" ds:itemID="{308942AA-0721-4324-BC2C-A3CB43F24E71}">
   <ds:schemaRefs>

</xml_diff>

<commit_message>
Revert "Revert "Merge branch 'master' of https://github.com/thelittlewozniak/iKitchen""
This reverts commit d6f8137a30341ae6373d3c4d1b6d81d7abace120.
</commit_message>
<xml_diff>
--- a/Fichiers analyse/IKitchen.pptx
+++ b/Fichiers analyse/IKitchen.pptx
@@ -5,10 +5,10 @@
     <p:sldMasterId id="2147483648" r:id="rId4"/>
   </p:sldMasterIdLst>
   <p:notesMasterIdLst>
-    <p:notesMasterId r:id="rId24"/>
+    <p:notesMasterId r:id="rId26"/>
   </p:notesMasterIdLst>
   <p:handoutMasterIdLst>
-    <p:handoutMasterId r:id="rId25"/>
+    <p:handoutMasterId r:id="rId27"/>
   </p:handoutMasterIdLst>
   <p:sldIdLst>
     <p:sldId id="256" r:id="rId5"/>
@@ -30,6 +30,8 @@
     <p:sldId id="276" r:id="rId21"/>
     <p:sldId id="278" r:id="rId22"/>
     <p:sldId id="283" r:id="rId23"/>
+    <p:sldId id="285" r:id="rId24"/>
+    <p:sldId id="286" r:id="rId25"/>
   </p:sldIdLst>
   <p:sldSz cx="12188825" cy="6858000"/>
   <p:notesSz cx="6858000" cy="9144000"/>
@@ -245,7 +247,7 @@
             <a:pPr rtl="0"/>
             <a:fld id="{439A2291-0035-4D64-A7A5-F36AC1AF399D}" type="datetime1">
               <a:rPr lang="fr-FR" smtClean="0"/>
-              <a:t>19/05/2018</a:t>
+              <a:t>21/05/2018</a:t>
             </a:fld>
             <a:endParaRPr lang="fr-FR" dirty="0"/>
           </a:p>
@@ -415,7 +417,7 @@
             <a:pPr rtl="0"/>
             <a:fld id="{4419B5CD-CE9D-4F17-8DE3-0045DF2A06F1}" type="datetime1">
               <a:rPr lang="fr-FR" noProof="0" smtClean="0"/>
-              <a:t>19/05/2018</a:t>
+              <a:t>21/05/2018</a:t>
             </a:fld>
             <a:endParaRPr lang="fr-FR" noProof="0" dirty="0"/>
           </a:p>
@@ -1584,7 +1586,7 @@
             <a:pPr rtl="0"/>
             <a:fld id="{FFED7672-6A17-4383-8E11-B703B2F244DD}" type="datetime1">
               <a:rPr lang="fr-FR" noProof="0" smtClean="0"/>
-              <a:t>19/05/2018</a:t>
+              <a:t>21/05/2018</a:t>
             </a:fld>
             <a:endParaRPr lang="fr-FR" noProof="0" dirty="0"/>
           </a:p>
@@ -1789,7 +1791,7 @@
             <a:pPr rtl="0"/>
             <a:fld id="{E1450B91-7D53-40A4-B2F5-AA5E0059FF2C}" type="datetime1">
               <a:rPr lang="fr-FR" noProof="0" smtClean="0"/>
-              <a:t>19/05/2018</a:t>
+              <a:t>21/05/2018</a:t>
             </a:fld>
             <a:endParaRPr lang="fr-FR" noProof="0" dirty="0"/>
           </a:p>
@@ -2343,7 +2345,7 @@
             <a:pPr rtl="0"/>
             <a:fld id="{3B681A6B-7357-4D25-8FC7-B90E847B95A8}" type="datetime1">
               <a:rPr lang="fr-FR" noProof="0" smtClean="0"/>
-              <a:t>19/05/2018</a:t>
+              <a:t>21/05/2018</a:t>
             </a:fld>
             <a:endParaRPr lang="fr-FR" noProof="0" dirty="0"/>
           </a:p>
@@ -2548,7 +2550,7 @@
             <a:pPr rtl="0"/>
             <a:fld id="{80C5A66A-4BD8-442B-B2CE-4DDC3F185A34}" type="datetime1">
               <a:rPr lang="fr-FR" noProof="0" smtClean="0"/>
-              <a:t>19/05/2018</a:t>
+              <a:t>21/05/2018</a:t>
             </a:fld>
             <a:endParaRPr lang="fr-FR" noProof="0" dirty="0"/>
           </a:p>
@@ -3156,7 +3158,7 @@
             <a:pPr rtl="0"/>
             <a:fld id="{70B7FDAA-B5D3-4E22-A82E-02191A2150B9}" type="datetime1">
               <a:rPr lang="fr-FR" noProof="0" smtClean="0"/>
-              <a:t>19/05/2018</a:t>
+              <a:t>21/05/2018</a:t>
             </a:fld>
             <a:endParaRPr lang="fr-FR" noProof="0" dirty="0"/>
           </a:p>
@@ -3472,7 +3474,7 @@
             <a:pPr rtl="0"/>
             <a:fld id="{BADF8559-33F4-416D-A710-49A46B99982C}" type="datetime1">
               <a:rPr lang="fr-FR" noProof="0" smtClean="0"/>
-              <a:t>19/05/2018</a:t>
+              <a:t>21/05/2018</a:t>
             </a:fld>
             <a:endParaRPr lang="fr-FR" noProof="0" dirty="0"/>
           </a:p>
@@ -3938,7 +3940,7 @@
             <a:pPr rtl="0"/>
             <a:fld id="{CF92E5DF-51C7-4012-82D0-A6F20F8A1C3B}" type="datetime1">
               <a:rPr lang="fr-FR" noProof="0" smtClean="0"/>
-              <a:t>19/05/2018</a:t>
+              <a:t>21/05/2018</a:t>
             </a:fld>
             <a:endParaRPr lang="fr-FR" noProof="0" dirty="0"/>
           </a:p>
@@ -4075,7 +4077,7 @@
             <a:pPr rtl="0"/>
             <a:fld id="{A66353DA-E3F6-4188-A918-D5978D2DC352}" type="datetime1">
               <a:rPr lang="fr-FR" noProof="0" smtClean="0"/>
-              <a:t>19/05/2018</a:t>
+              <a:t>21/05/2018</a:t>
             </a:fld>
             <a:endParaRPr lang="fr-FR" noProof="0" dirty="0"/>
           </a:p>
@@ -4371,7 +4373,7 @@
             <a:pPr rtl="0"/>
             <a:fld id="{227CDB5E-87EB-400A-AF0C-7B4E7074CB2E}" type="datetime1">
               <a:rPr lang="fr-FR" noProof="0" smtClean="0"/>
-              <a:t>19/05/2018</a:t>
+              <a:t>21/05/2018</a:t>
             </a:fld>
             <a:endParaRPr lang="fr-FR" noProof="0" dirty="0"/>
           </a:p>
@@ -4674,7 +4676,7 @@
             <a:pPr rtl="0"/>
             <a:fld id="{9B92CBFA-02BE-4A2B-B3DF-CE42DCACD8FF}" type="datetime1">
               <a:rPr lang="fr-FR" noProof="0" smtClean="0"/>
-              <a:t>19/05/2018</a:t>
+              <a:t>21/05/2018</a:t>
             </a:fld>
             <a:endParaRPr lang="fr-FR" noProof="0" dirty="0"/>
           </a:p>
@@ -4963,7 +4965,7 @@
             <a:pPr rtl="0"/>
             <a:fld id="{5B8044B4-8DC2-481B-A751-5605C20AC4B9}" type="datetime1">
               <a:rPr lang="fr-FR" noProof="0" smtClean="0"/>
-              <a:t>19/05/2018</a:t>
+              <a:t>21/05/2018</a:t>
             </a:fld>
             <a:endParaRPr lang="fr-FR" noProof="0" dirty="0"/>
           </a:p>
@@ -5546,7 +5548,7 @@
             <a:pPr rtl="0"/>
             <a:fld id="{01DFB95D-D541-4088-8BCE-2FF8F06A12B2}" type="datetime1">
               <a:rPr lang="fr-FR" noProof="0" smtClean="0"/>
-              <a:t>19/05/2018</a:t>
+              <a:t>21/05/2018</a:t>
             </a:fld>
             <a:endParaRPr lang="fr-FR" noProof="0" dirty="0"/>
           </a:p>
@@ -7428,7 +7430,7 @@
         </p:blipFill>
         <p:spPr>
           <a:xfrm>
-            <a:off x="1485900" y="2306273"/>
+            <a:off x="1057606" y="2416629"/>
             <a:ext cx="3753374" cy="3343742"/>
           </a:xfrm>
           <a:prstGeom prst="rect">
@@ -7450,7 +7452,7 @@
         </p:nvSpPr>
         <p:spPr>
           <a:xfrm>
-            <a:off x="6454452" y="1772816"/>
+            <a:off x="6643999" y="540539"/>
             <a:ext cx="4248473" cy="2520280"/>
           </a:xfrm>
           <a:prstGeom prst="ellipse">
@@ -7510,6 +7512,42 @@
           </a:p>
         </p:txBody>
       </p:sp>
+      <p:pic>
+        <p:nvPicPr>
+          <p:cNvPr id="5" name="Image 4">
+            <a:extLst>
+              <a:ext uri="{FF2B5EF4-FFF2-40B4-BE49-F238E27FC236}">
+                <a16:creationId xmlns:a16="http://schemas.microsoft.com/office/drawing/2014/main" id="{BA8BDA2F-C2C1-48AB-9975-2DE39E173172}"/>
+              </a:ext>
+            </a:extLst>
+          </p:cNvPr>
+          <p:cNvPicPr>
+            <a:picLocks noChangeAspect="1"/>
+          </p:cNvPicPr>
+          <p:nvPr/>
+        </p:nvPicPr>
+        <p:blipFill>
+          <a:blip r:embed="rId3">
+            <a:extLst>
+              <a:ext uri="{28A0092B-C50C-407E-A947-70E740481C1C}">
+                <a14:useLocalDpi xmlns:a14="http://schemas.microsoft.com/office/drawing/2010/main" val="0"/>
+              </a:ext>
+            </a:extLst>
+          </a:blip>
+          <a:stretch>
+            <a:fillRect/>
+          </a:stretch>
+        </p:blipFill>
+        <p:spPr>
+          <a:xfrm>
+            <a:off x="4805920" y="3212746"/>
+            <a:ext cx="7382905" cy="3105583"/>
+          </a:xfrm>
+          <a:prstGeom prst="rect">
+            <a:avLst/>
+          </a:prstGeom>
+        </p:spPr>
+      </p:pic>
     </p:spTree>
     <p:extLst>
       <p:ext uri="{BB962C8B-B14F-4D97-AF65-F5344CB8AC3E}">
@@ -8399,6 +8437,770 @@
     <p:extLst>
       <p:ext uri="{BB962C8B-B14F-4D97-AF65-F5344CB8AC3E}">
         <p14:creationId xmlns:p14="http://schemas.microsoft.com/office/powerpoint/2010/main" val="2041341814"/>
+      </p:ext>
+    </p:extLst>
+  </p:cSld>
+  <p:clrMapOvr>
+    <a:masterClrMapping/>
+  </p:clrMapOvr>
+  <mc:AlternateContent xmlns:mc="http://schemas.openxmlformats.org/markup-compatibility/2006" xmlns:p14="http://schemas.microsoft.com/office/powerpoint/2010/main">
+    <mc:Choice Requires="p14">
+      <p:transition spd="med" p14:dur="700">
+        <p:fade/>
+      </p:transition>
+    </mc:Choice>
+    <mc:Fallback xmlns="">
+      <p:transition spd="med">
+        <p:fade/>
+      </p:transition>
+    </mc:Fallback>
+  </mc:AlternateContent>
+</p:sld>
+</file>
+
+<file path=ppt/slides/slide20.xml><?xml version="1.0" encoding="utf-8"?>
+<p:sld xmlns:a="http://schemas.openxmlformats.org/drawingml/2006/main" xmlns:r="http://schemas.openxmlformats.org/officeDocument/2006/relationships" xmlns:p="http://schemas.openxmlformats.org/presentationml/2006/main">
+  <p:cSld>
+    <p:spTree>
+      <p:nvGrpSpPr>
+        <p:cNvPr id="1" name=""/>
+        <p:cNvGrpSpPr/>
+        <p:nvPr/>
+      </p:nvGrpSpPr>
+      <p:grpSpPr>
+        <a:xfrm>
+          <a:off x="0" y="0"/>
+          <a:ext cx="0" cy="0"/>
+          <a:chOff x="0" y="0"/>
+          <a:chExt cx="0" cy="0"/>
+        </a:xfrm>
+      </p:grpSpPr>
+      <p:sp>
+        <p:nvSpPr>
+          <p:cNvPr id="2" name="Titre 1">
+            <a:extLst>
+              <a:ext uri="{FF2B5EF4-FFF2-40B4-BE49-F238E27FC236}">
+                <a16:creationId xmlns:a16="http://schemas.microsoft.com/office/drawing/2014/main" id="{B43AFA5A-ED24-437F-8675-C9BCC48D2814}"/>
+              </a:ext>
+            </a:extLst>
+          </p:cNvPr>
+          <p:cNvSpPr>
+            <a:spLocks noGrp="1"/>
+          </p:cNvSpPr>
+          <p:nvPr>
+            <p:ph type="title"/>
+          </p:nvPr>
+        </p:nvSpPr>
+        <p:spPr/>
+        <p:txBody>
+          <a:bodyPr/>
+          <a:lstStyle/>
+          <a:p>
+            <a:r>
+              <a:rPr lang="fr-BE" dirty="0"/>
+              <a:t>Conclusions</a:t>
+            </a:r>
+          </a:p>
+        </p:txBody>
+      </p:sp>
+      <p:sp>
+        <p:nvSpPr>
+          <p:cNvPr id="3" name="Espace réservé du texte 2">
+            <a:extLst>
+              <a:ext uri="{FF2B5EF4-FFF2-40B4-BE49-F238E27FC236}">
+                <a16:creationId xmlns:a16="http://schemas.microsoft.com/office/drawing/2014/main" id="{DF704CA3-390A-4E10-8E74-1648D10E72F6}"/>
+              </a:ext>
+            </a:extLst>
+          </p:cNvPr>
+          <p:cNvSpPr>
+            <a:spLocks noGrp="1"/>
+          </p:cNvSpPr>
+          <p:nvPr>
+            <p:ph type="body" idx="1"/>
+          </p:nvPr>
+        </p:nvSpPr>
+        <p:spPr/>
+        <p:txBody>
+          <a:bodyPr/>
+          <a:lstStyle/>
+          <a:p>
+            <a:r>
+              <a:rPr lang="fr-BE" dirty="0" err="1"/>
+              <a:t>What</a:t>
+            </a:r>
+            <a:r>
+              <a:rPr lang="fr-BE" dirty="0"/>
+              <a:t> are </a:t>
+            </a:r>
+            <a:r>
+              <a:rPr lang="fr-BE" dirty="0" err="1"/>
+              <a:t>our</a:t>
+            </a:r>
+            <a:r>
+              <a:rPr lang="fr-BE" dirty="0"/>
+              <a:t> </a:t>
+            </a:r>
+            <a:r>
+              <a:rPr lang="fr-BE" dirty="0" err="1"/>
+              <a:t>thoughts</a:t>
+            </a:r>
+            <a:r>
+              <a:rPr lang="fr-BE" dirty="0"/>
+              <a:t> about </a:t>
+            </a:r>
+            <a:r>
+              <a:rPr lang="fr-BE" dirty="0" err="1"/>
+              <a:t>this</a:t>
+            </a:r>
+            <a:r>
+              <a:rPr lang="fr-BE" dirty="0"/>
+              <a:t> </a:t>
+            </a:r>
+            <a:r>
+              <a:rPr lang="fr-BE" dirty="0" err="1"/>
+              <a:t>project</a:t>
+            </a:r>
+            <a:r>
+              <a:rPr lang="fr-BE" dirty="0"/>
+              <a:t> ?</a:t>
+            </a:r>
+          </a:p>
+        </p:txBody>
+      </p:sp>
+    </p:spTree>
+    <p:extLst>
+      <p:ext uri="{BB962C8B-B14F-4D97-AF65-F5344CB8AC3E}">
+        <p14:creationId xmlns:p14="http://schemas.microsoft.com/office/powerpoint/2010/main" val="2810083180"/>
+      </p:ext>
+    </p:extLst>
+  </p:cSld>
+  <p:clrMapOvr>
+    <a:masterClrMapping/>
+  </p:clrMapOvr>
+  <mc:AlternateContent xmlns:mc="http://schemas.openxmlformats.org/markup-compatibility/2006" xmlns:p14="http://schemas.microsoft.com/office/powerpoint/2010/main">
+    <mc:Choice Requires="p14">
+      <p:transition spd="med" p14:dur="700">
+        <p:fade/>
+      </p:transition>
+    </mc:Choice>
+    <mc:Fallback xmlns="">
+      <p:transition spd="med">
+        <p:fade/>
+      </p:transition>
+    </mc:Fallback>
+  </mc:AlternateContent>
+</p:sld>
+</file>
+
+<file path=ppt/slides/slide21.xml><?xml version="1.0" encoding="utf-8"?>
+<p:sld xmlns:a="http://schemas.openxmlformats.org/drawingml/2006/main" xmlns:r="http://schemas.openxmlformats.org/officeDocument/2006/relationships" xmlns:p="http://schemas.openxmlformats.org/presentationml/2006/main">
+  <p:cSld>
+    <p:spTree>
+      <p:nvGrpSpPr>
+        <p:cNvPr id="1" name=""/>
+        <p:cNvGrpSpPr/>
+        <p:nvPr/>
+      </p:nvGrpSpPr>
+      <p:grpSpPr>
+        <a:xfrm>
+          <a:off x="0" y="0"/>
+          <a:ext cx="0" cy="0"/>
+          <a:chOff x="0" y="0"/>
+          <a:chExt cx="0" cy="0"/>
+        </a:xfrm>
+      </p:grpSpPr>
+      <p:sp>
+        <p:nvSpPr>
+          <p:cNvPr id="2" name="Titre 1">
+            <a:extLst>
+              <a:ext uri="{FF2B5EF4-FFF2-40B4-BE49-F238E27FC236}">
+                <a16:creationId xmlns:a16="http://schemas.microsoft.com/office/drawing/2014/main" id="{5109000C-F2A5-4981-9FD6-53BC3D3C3387}"/>
+              </a:ext>
+            </a:extLst>
+          </p:cNvPr>
+          <p:cNvSpPr>
+            <a:spLocks noGrp="1"/>
+          </p:cNvSpPr>
+          <p:nvPr>
+            <p:ph type="title"/>
+          </p:nvPr>
+        </p:nvSpPr>
+        <p:spPr/>
+        <p:txBody>
+          <a:bodyPr/>
+          <a:lstStyle/>
+          <a:p>
+            <a:r>
+              <a:rPr lang="fr-BE" dirty="0"/>
+              <a:t>Conclusions</a:t>
+            </a:r>
+          </a:p>
+        </p:txBody>
+      </p:sp>
+      <p:sp>
+        <p:nvSpPr>
+          <p:cNvPr id="3" name="Espace réservé du texte 2">
+            <a:extLst>
+              <a:ext uri="{FF2B5EF4-FFF2-40B4-BE49-F238E27FC236}">
+                <a16:creationId xmlns:a16="http://schemas.microsoft.com/office/drawing/2014/main" id="{87CD1E14-1038-45A3-955B-6A9CDDE02F9E}"/>
+              </a:ext>
+            </a:extLst>
+          </p:cNvPr>
+          <p:cNvSpPr>
+            <a:spLocks noGrp="1"/>
+          </p:cNvSpPr>
+          <p:nvPr>
+            <p:ph type="body" idx="1"/>
+          </p:nvPr>
+        </p:nvSpPr>
+        <p:spPr>
+          <a:xfrm>
+            <a:off x="1141412" y="1524000"/>
+            <a:ext cx="2720752" cy="816429"/>
+          </a:xfrm>
+        </p:spPr>
+        <p:txBody>
+          <a:bodyPr/>
+          <a:lstStyle/>
+          <a:p>
+            <a:r>
+              <a:rPr lang="fr-BE" dirty="0" err="1"/>
+              <a:t>Flavian</a:t>
+            </a:r>
+            <a:r>
+              <a:rPr lang="fr-BE" dirty="0"/>
+              <a:t> Bisconti</a:t>
+            </a:r>
+          </a:p>
+        </p:txBody>
+      </p:sp>
+      <p:sp>
+        <p:nvSpPr>
+          <p:cNvPr id="4" name="Espace réservé du contenu 3">
+            <a:extLst>
+              <a:ext uri="{FF2B5EF4-FFF2-40B4-BE49-F238E27FC236}">
+                <a16:creationId xmlns:a16="http://schemas.microsoft.com/office/drawing/2014/main" id="{711EAB25-4ADE-4445-8633-85D4187A6561}"/>
+              </a:ext>
+            </a:extLst>
+          </p:cNvPr>
+          <p:cNvSpPr>
+            <a:spLocks noGrp="1"/>
+          </p:cNvSpPr>
+          <p:nvPr>
+            <p:ph sz="half" idx="2"/>
+          </p:nvPr>
+        </p:nvSpPr>
+        <p:spPr>
+          <a:xfrm>
+            <a:off x="1141412" y="2338614"/>
+            <a:ext cx="3195914" cy="3833585"/>
+          </a:xfrm>
+        </p:spPr>
+        <p:txBody>
+          <a:bodyPr>
+            <a:normAutofit/>
+          </a:bodyPr>
+          <a:lstStyle/>
+          <a:p>
+            <a:r>
+              <a:rPr lang="fr-BE" sz="1800" dirty="0" err="1"/>
+              <a:t>Devised</a:t>
+            </a:r>
+            <a:r>
+              <a:rPr lang="fr-BE" sz="1800" dirty="0"/>
+              <a:t> an application for the first time</a:t>
+            </a:r>
+          </a:p>
+          <a:p>
+            <a:r>
+              <a:rPr lang="fr-BE" sz="1800" dirty="0" err="1"/>
+              <a:t>Took</a:t>
+            </a:r>
+            <a:r>
+              <a:rPr lang="fr-BE" sz="1800" dirty="0"/>
+              <a:t> </a:t>
+            </a:r>
+            <a:r>
+              <a:rPr lang="fr-BE" sz="1800" dirty="0" err="1"/>
+              <a:t>pleasure</a:t>
+            </a:r>
+            <a:r>
+              <a:rPr lang="fr-BE" sz="1800" dirty="0"/>
+              <a:t> in </a:t>
+            </a:r>
+            <a:r>
+              <a:rPr lang="fr-BE" sz="1800" dirty="0" err="1"/>
+              <a:t>programming</a:t>
+            </a:r>
+            <a:endParaRPr lang="fr-BE" sz="1800" dirty="0"/>
+          </a:p>
+          <a:p>
+            <a:r>
+              <a:rPr lang="fr-BE" sz="1800" dirty="0" err="1"/>
+              <a:t>Used</a:t>
+            </a:r>
+            <a:r>
+              <a:rPr lang="fr-BE" sz="1800" dirty="0"/>
+              <a:t> and </a:t>
+            </a:r>
+            <a:r>
+              <a:rPr lang="fr-BE" sz="1800" dirty="0" err="1"/>
+              <a:t>improved</a:t>
+            </a:r>
+            <a:r>
+              <a:rPr lang="fr-BE" sz="1800" dirty="0"/>
+              <a:t> </a:t>
+            </a:r>
+            <a:r>
+              <a:rPr lang="fr-BE" sz="1800" dirty="0" err="1"/>
+              <a:t>skills</a:t>
+            </a:r>
+            <a:r>
+              <a:rPr lang="fr-BE" sz="1800" dirty="0"/>
+              <a:t> </a:t>
+            </a:r>
+            <a:r>
+              <a:rPr lang="fr-BE" sz="1800" dirty="0" err="1"/>
+              <a:t>from</a:t>
+            </a:r>
+            <a:r>
+              <a:rPr lang="fr-BE" sz="1800" dirty="0"/>
+              <a:t> </a:t>
+            </a:r>
+            <a:r>
+              <a:rPr lang="fr-BE" sz="1800" dirty="0" err="1"/>
+              <a:t>secondary</a:t>
+            </a:r>
+            <a:r>
+              <a:rPr lang="fr-BE" sz="1800" dirty="0"/>
+              <a:t> </a:t>
+            </a:r>
+            <a:r>
+              <a:rPr lang="fr-BE" sz="1800" dirty="0" err="1"/>
+              <a:t>school</a:t>
+            </a:r>
+            <a:endParaRPr lang="fr-BE" sz="1800" dirty="0"/>
+          </a:p>
+          <a:p>
+            <a:r>
+              <a:rPr lang="fr-BE" sz="1800" dirty="0" err="1"/>
+              <a:t>Strenghtened</a:t>
+            </a:r>
+            <a:r>
+              <a:rPr lang="fr-BE" sz="1800" dirty="0"/>
+              <a:t> </a:t>
+            </a:r>
+            <a:r>
+              <a:rPr lang="fr-BE" sz="1800" dirty="0" err="1"/>
+              <a:t>teamwork</a:t>
+            </a:r>
+            <a:r>
+              <a:rPr lang="fr-BE" sz="1800" dirty="0"/>
+              <a:t> </a:t>
+            </a:r>
+            <a:r>
+              <a:rPr lang="fr-BE" sz="1800" dirty="0" err="1"/>
+              <a:t>capabilities</a:t>
+            </a:r>
+            <a:endParaRPr lang="fr-BE" sz="1800" dirty="0"/>
+          </a:p>
+          <a:p>
+            <a:r>
+              <a:rPr lang="fr-BE" sz="1800" dirty="0" err="1"/>
+              <a:t>Learned</a:t>
+            </a:r>
+            <a:r>
+              <a:rPr lang="fr-BE" sz="1800" dirty="0"/>
+              <a:t> how to focus on one issue at a time</a:t>
+            </a:r>
+          </a:p>
+          <a:p>
+            <a:endParaRPr lang="fr-BE" sz="1800" dirty="0"/>
+          </a:p>
+          <a:p>
+            <a:endParaRPr lang="fr-BE" sz="1000" dirty="0"/>
+          </a:p>
+          <a:p>
+            <a:endParaRPr lang="fr-BE" sz="1800" dirty="0"/>
+          </a:p>
+          <a:p>
+            <a:endParaRPr lang="fr-BE" sz="1800" dirty="0"/>
+          </a:p>
+        </p:txBody>
+      </p:sp>
+      <p:sp>
+        <p:nvSpPr>
+          <p:cNvPr id="5" name="Espace réservé du texte 4">
+            <a:extLst>
+              <a:ext uri="{FF2B5EF4-FFF2-40B4-BE49-F238E27FC236}">
+                <a16:creationId xmlns:a16="http://schemas.microsoft.com/office/drawing/2014/main" id="{0C82FBF4-B232-4869-A0B9-CC460A91D5DF}"/>
+              </a:ext>
+            </a:extLst>
+          </p:cNvPr>
+          <p:cNvSpPr>
+            <a:spLocks noGrp="1"/>
+          </p:cNvSpPr>
+          <p:nvPr>
+            <p:ph type="body" sz="quarter" idx="3"/>
+          </p:nvPr>
+        </p:nvSpPr>
+        <p:spPr>
+          <a:xfrm>
+            <a:off x="4655586" y="1522185"/>
+            <a:ext cx="2784004" cy="816429"/>
+          </a:xfrm>
+        </p:spPr>
+        <p:txBody>
+          <a:bodyPr/>
+          <a:lstStyle/>
+          <a:p>
+            <a:r>
+              <a:rPr lang="fr-BE" dirty="0"/>
+              <a:t>Quentin </a:t>
+            </a:r>
+            <a:r>
+              <a:rPr lang="fr-BE" dirty="0" err="1"/>
+              <a:t>Zaretti</a:t>
+            </a:r>
+            <a:endParaRPr lang="fr-BE" dirty="0"/>
+          </a:p>
+        </p:txBody>
+      </p:sp>
+      <p:sp>
+        <p:nvSpPr>
+          <p:cNvPr id="6" name="Espace réservé du contenu 5">
+            <a:extLst>
+              <a:ext uri="{FF2B5EF4-FFF2-40B4-BE49-F238E27FC236}">
+                <a16:creationId xmlns:a16="http://schemas.microsoft.com/office/drawing/2014/main" id="{72A85B2C-4AE9-487D-BA8F-5BC97E25AB72}"/>
+              </a:ext>
+            </a:extLst>
+          </p:cNvPr>
+          <p:cNvSpPr>
+            <a:spLocks noGrp="1"/>
+          </p:cNvSpPr>
+          <p:nvPr>
+            <p:ph sz="quarter" idx="4"/>
+          </p:nvPr>
+        </p:nvSpPr>
+        <p:spPr>
+          <a:xfrm>
+            <a:off x="7868540" y="2338614"/>
+            <a:ext cx="3195913" cy="3759199"/>
+          </a:xfrm>
+        </p:spPr>
+        <p:txBody>
+          <a:bodyPr/>
+          <a:lstStyle/>
+          <a:p>
+            <a:endParaRPr lang="fr-BE" dirty="0"/>
+          </a:p>
+        </p:txBody>
+      </p:sp>
+      <p:sp>
+        <p:nvSpPr>
+          <p:cNvPr id="7" name="Espace réservé du texte 4">
+            <a:extLst>
+              <a:ext uri="{FF2B5EF4-FFF2-40B4-BE49-F238E27FC236}">
+                <a16:creationId xmlns:a16="http://schemas.microsoft.com/office/drawing/2014/main" id="{8946F920-A735-45D9-AB65-C5BE09E681D8}"/>
+              </a:ext>
+            </a:extLst>
+          </p:cNvPr>
+          <p:cNvSpPr txBox="1">
+            <a:spLocks/>
+          </p:cNvSpPr>
+          <p:nvPr/>
+        </p:nvSpPr>
+        <p:spPr>
+          <a:xfrm>
+            <a:off x="7822604" y="1547585"/>
+            <a:ext cx="3224808" cy="816429"/>
+          </a:xfrm>
+          <a:prstGeom prst="rect">
+            <a:avLst/>
+          </a:prstGeom>
+        </p:spPr>
+        <p:txBody>
+          <a:bodyPr vert="horz" lIns="121899" tIns="60949" rIns="121899" bIns="60949" rtlCol="0" anchor="ctr">
+            <a:normAutofit/>
+          </a:bodyPr>
+          <a:lstStyle>
+            <a:lvl1pPr marL="0" indent="0" algn="l" defTabSz="1218987" rtl="0" eaLnBrk="1" latinLnBrk="0" hangingPunct="1">
+              <a:lnSpc>
+                <a:spcPct val="90000"/>
+              </a:lnSpc>
+              <a:spcBef>
+                <a:spcPts val="1800"/>
+              </a:spcBef>
+              <a:buClr>
+                <a:schemeClr val="accent1">
+                  <a:lumMod val="75000"/>
+                </a:schemeClr>
+              </a:buClr>
+              <a:buFont typeface="Arial" pitchFamily="34" charset="0"/>
+              <a:buNone/>
+              <a:defRPr sz="2800" b="0" kern="1200">
+                <a:solidFill>
+                  <a:schemeClr val="accent1">
+                    <a:lumMod val="75000"/>
+                  </a:schemeClr>
+                </a:solidFill>
+                <a:latin typeface="+mn-lt"/>
+                <a:ea typeface="+mn-ea"/>
+                <a:cs typeface="+mn-cs"/>
+              </a:defRPr>
+            </a:lvl1pPr>
+            <a:lvl2pPr marL="609493" indent="0" algn="l" defTabSz="1218987" rtl="0" eaLnBrk="1" latinLnBrk="0" hangingPunct="1">
+              <a:lnSpc>
+                <a:spcPct val="90000"/>
+              </a:lnSpc>
+              <a:spcBef>
+                <a:spcPts val="1200"/>
+              </a:spcBef>
+              <a:buClr>
+                <a:schemeClr val="accent1">
+                  <a:lumMod val="75000"/>
+                </a:schemeClr>
+              </a:buClr>
+              <a:buFont typeface="Arial" pitchFamily="34" charset="0"/>
+              <a:buNone/>
+              <a:defRPr sz="2700" b="1" kern="1200">
+                <a:solidFill>
+                  <a:schemeClr val="tx1"/>
+                </a:solidFill>
+                <a:latin typeface="+mn-lt"/>
+                <a:ea typeface="+mn-ea"/>
+                <a:cs typeface="+mn-cs"/>
+              </a:defRPr>
+            </a:lvl2pPr>
+            <a:lvl3pPr marL="1218987" indent="0" algn="l" defTabSz="1218987" rtl="0" eaLnBrk="1" latinLnBrk="0" hangingPunct="1">
+              <a:lnSpc>
+                <a:spcPct val="90000"/>
+              </a:lnSpc>
+              <a:spcBef>
+                <a:spcPts val="800"/>
+              </a:spcBef>
+              <a:buClr>
+                <a:schemeClr val="accent1">
+                  <a:lumMod val="75000"/>
+                </a:schemeClr>
+              </a:buClr>
+              <a:buFont typeface="Arial" pitchFamily="34" charset="0"/>
+              <a:buNone/>
+              <a:defRPr sz="2400" b="1" kern="1200">
+                <a:solidFill>
+                  <a:schemeClr val="tx1"/>
+                </a:solidFill>
+                <a:latin typeface="+mn-lt"/>
+                <a:ea typeface="+mn-ea"/>
+                <a:cs typeface="+mn-cs"/>
+              </a:defRPr>
+            </a:lvl3pPr>
+            <a:lvl4pPr marL="1828480" indent="0" algn="l" defTabSz="1218987" rtl="0" eaLnBrk="1" latinLnBrk="0" hangingPunct="1">
+              <a:lnSpc>
+                <a:spcPct val="90000"/>
+              </a:lnSpc>
+              <a:spcBef>
+                <a:spcPts val="800"/>
+              </a:spcBef>
+              <a:buClr>
+                <a:schemeClr val="accent1">
+                  <a:lumMod val="75000"/>
+                </a:schemeClr>
+              </a:buClr>
+              <a:buFont typeface="Arial" pitchFamily="34" charset="0"/>
+              <a:buNone/>
+              <a:defRPr sz="2100" b="1" kern="1200">
+                <a:solidFill>
+                  <a:schemeClr val="tx1"/>
+                </a:solidFill>
+                <a:latin typeface="+mn-lt"/>
+                <a:ea typeface="+mn-ea"/>
+                <a:cs typeface="+mn-cs"/>
+              </a:defRPr>
+            </a:lvl4pPr>
+            <a:lvl5pPr marL="2437973" indent="0" algn="l" defTabSz="1218987" rtl="0" eaLnBrk="1" latinLnBrk="0" hangingPunct="1">
+              <a:lnSpc>
+                <a:spcPct val="90000"/>
+              </a:lnSpc>
+              <a:spcBef>
+                <a:spcPts val="800"/>
+              </a:spcBef>
+              <a:buClr>
+                <a:schemeClr val="accent1">
+                  <a:lumMod val="75000"/>
+                </a:schemeClr>
+              </a:buClr>
+              <a:buFont typeface="Arial" pitchFamily="34" charset="0"/>
+              <a:buNone/>
+              <a:defRPr sz="2100" b="1" kern="1200">
+                <a:solidFill>
+                  <a:schemeClr val="tx1"/>
+                </a:solidFill>
+                <a:latin typeface="+mn-lt"/>
+                <a:ea typeface="+mn-ea"/>
+                <a:cs typeface="+mn-cs"/>
+              </a:defRPr>
+            </a:lvl5pPr>
+            <a:lvl6pPr marL="3047467" indent="0" algn="l" defTabSz="1218987" rtl="0" eaLnBrk="1" latinLnBrk="0" hangingPunct="1">
+              <a:lnSpc>
+                <a:spcPct val="90000"/>
+              </a:lnSpc>
+              <a:spcBef>
+                <a:spcPts val="800"/>
+              </a:spcBef>
+              <a:buClr>
+                <a:schemeClr val="accent1"/>
+              </a:buClr>
+              <a:buFont typeface="Arial" pitchFamily="34" charset="0"/>
+              <a:buNone/>
+              <a:defRPr sz="2100" b="1" kern="1200" baseline="0">
+                <a:solidFill>
+                  <a:schemeClr val="tx1"/>
+                </a:solidFill>
+                <a:latin typeface="+mn-lt"/>
+                <a:ea typeface="+mn-ea"/>
+                <a:cs typeface="+mn-cs"/>
+              </a:defRPr>
+            </a:lvl6pPr>
+            <a:lvl7pPr marL="3656960" indent="0" algn="l" defTabSz="1218987" rtl="0" eaLnBrk="1" latinLnBrk="0" hangingPunct="1">
+              <a:lnSpc>
+                <a:spcPct val="90000"/>
+              </a:lnSpc>
+              <a:spcBef>
+                <a:spcPts val="800"/>
+              </a:spcBef>
+              <a:buClr>
+                <a:schemeClr val="accent1"/>
+              </a:buClr>
+              <a:buFont typeface="Arial" pitchFamily="34" charset="0"/>
+              <a:buNone/>
+              <a:defRPr sz="2100" b="1" kern="1200" baseline="0">
+                <a:solidFill>
+                  <a:schemeClr val="tx1"/>
+                </a:solidFill>
+                <a:latin typeface="+mn-lt"/>
+                <a:ea typeface="+mn-ea"/>
+                <a:cs typeface="+mn-cs"/>
+              </a:defRPr>
+            </a:lvl7pPr>
+            <a:lvl8pPr marL="4266453" indent="0" algn="l" defTabSz="1218987" rtl="0" eaLnBrk="1" latinLnBrk="0" hangingPunct="1">
+              <a:lnSpc>
+                <a:spcPct val="90000"/>
+              </a:lnSpc>
+              <a:spcBef>
+                <a:spcPts val="800"/>
+              </a:spcBef>
+              <a:buClr>
+                <a:schemeClr val="accent1"/>
+              </a:buClr>
+              <a:buFont typeface="Arial" pitchFamily="34" charset="0"/>
+              <a:buNone/>
+              <a:defRPr sz="2100" b="1" kern="1200" baseline="0">
+                <a:solidFill>
+                  <a:schemeClr val="tx1"/>
+                </a:solidFill>
+                <a:latin typeface="+mn-lt"/>
+                <a:ea typeface="+mn-ea"/>
+                <a:cs typeface="+mn-cs"/>
+              </a:defRPr>
+            </a:lvl8pPr>
+            <a:lvl9pPr marL="4875947" indent="0" algn="l" defTabSz="1218987" rtl="0" eaLnBrk="1" latinLnBrk="0" hangingPunct="1">
+              <a:lnSpc>
+                <a:spcPct val="90000"/>
+              </a:lnSpc>
+              <a:spcBef>
+                <a:spcPts val="800"/>
+              </a:spcBef>
+              <a:buClr>
+                <a:schemeClr val="accent1"/>
+              </a:buClr>
+              <a:buFont typeface="Arial" pitchFamily="34" charset="0"/>
+              <a:buNone/>
+              <a:defRPr sz="2100" b="1" kern="1200" baseline="0">
+                <a:solidFill>
+                  <a:schemeClr val="tx1"/>
+                </a:solidFill>
+                <a:latin typeface="+mn-lt"/>
+                <a:ea typeface="+mn-ea"/>
+                <a:cs typeface="+mn-cs"/>
+              </a:defRPr>
+            </a:lvl9pPr>
+          </a:lstStyle>
+          <a:p>
+            <a:r>
+              <a:rPr lang="fr-BE" dirty="0"/>
+              <a:t>Nathan Pire</a:t>
+            </a:r>
+          </a:p>
+        </p:txBody>
+      </p:sp>
+      <p:sp>
+        <p:nvSpPr>
+          <p:cNvPr id="11" name="ZoneTexte 10">
+            <a:extLst>
+              <a:ext uri="{FF2B5EF4-FFF2-40B4-BE49-F238E27FC236}">
+                <a16:creationId xmlns:a16="http://schemas.microsoft.com/office/drawing/2014/main" id="{21838E39-BE5B-469F-B9B5-C596D3246986}"/>
+              </a:ext>
+            </a:extLst>
+          </p:cNvPr>
+          <p:cNvSpPr txBox="1"/>
+          <p:nvPr/>
+        </p:nvSpPr>
+        <p:spPr>
+          <a:xfrm>
+            <a:off x="4292802" y="2411185"/>
+            <a:ext cx="3531214" cy="3785652"/>
+          </a:xfrm>
+          <a:prstGeom prst="rect">
+            <a:avLst/>
+          </a:prstGeom>
+          <a:noFill/>
+        </p:spPr>
+        <p:txBody>
+          <a:bodyPr wrap="square" rtlCol="0">
+            <a:spAutoFit/>
+          </a:bodyPr>
+          <a:lstStyle/>
+          <a:p>
+            <a:pPr marL="342900" indent="-342900">
+              <a:buFont typeface="Arial" panose="020B0604020202020204" pitchFamily="34" charset="0"/>
+              <a:buChar char="•"/>
+            </a:pPr>
+            <a:endParaRPr lang="fr-BE" dirty="0"/>
+          </a:p>
+          <a:p>
+            <a:endParaRPr lang="fr-BE" dirty="0"/>
+          </a:p>
+          <a:p>
+            <a:endParaRPr lang="fr-BE" dirty="0"/>
+          </a:p>
+          <a:p>
+            <a:endParaRPr lang="fr-BE" dirty="0"/>
+          </a:p>
+          <a:p>
+            <a:endParaRPr lang="fr-BE" dirty="0"/>
+          </a:p>
+          <a:p>
+            <a:endParaRPr lang="fr-BE" dirty="0"/>
+          </a:p>
+          <a:p>
+            <a:endParaRPr lang="fr-BE" dirty="0"/>
+          </a:p>
+          <a:p>
+            <a:endParaRPr lang="fr-BE" dirty="0"/>
+          </a:p>
+          <a:p>
+            <a:endParaRPr lang="fr-BE" dirty="0"/>
+          </a:p>
+          <a:p>
+            <a:endParaRPr lang="fr-BE" dirty="0"/>
+          </a:p>
+        </p:txBody>
+      </p:sp>
+    </p:spTree>
+    <p:extLst>
+      <p:ext uri="{BB962C8B-B14F-4D97-AF65-F5344CB8AC3E}">
+        <p14:creationId xmlns:p14="http://schemas.microsoft.com/office/powerpoint/2010/main" val="4081864857"/>
       </p:ext>
     </p:extLst>
   </p:cSld>
@@ -10389,6 +11191,17 @@
 </file>
 
 <file path=customXml/item1.xml><?xml version="1.0" encoding="utf-8"?>
+<p:properties xmlns:p="http://schemas.microsoft.com/office/2006/metadata/properties" xmlns:xsi="http://www.w3.org/2001/XMLSchema-instance" xmlns:pc="http://schemas.microsoft.com/office/infopath/2007/PartnerControls">
+  <documentManagement>
+    <VSO_x0020_item_x0020_id xmlns="40262f94-9f35-4ac3-9a90-690165a166b7" xsi:nil="true"/>
+    <Assetid_x0020_ xmlns="40262f94-9f35-4ac3-9a90-690165a166b7" xsi:nil="true"/>
+    <Item_x0020_Details xmlns="40262f94-9f35-4ac3-9a90-690165a166b7" xsi:nil="true"/>
+    <Template_x0020_details xmlns="40262f94-9f35-4ac3-9a90-690165a166b7" xsi:nil="true"/>
+  </documentManagement>
+</p:properties>
+</file>
+
+<file path=customXml/item2.xml><?xml version="1.0" encoding="utf-8"?>
 <ct:contentTypeSchema xmlns:ct="http://schemas.microsoft.com/office/2006/metadata/contentType" xmlns:ma="http://schemas.microsoft.com/office/2006/metadata/properties/metaAttributes" ct:_="" ma:_="" ma:contentTypeName="Document" ma:contentTypeID="0x010100AA3F7D94069FF64A86F7DFF56D60E3BE" ma:contentTypeVersion="6" ma:contentTypeDescription="Create a new document." ma:contentTypeScope="" ma:versionID="c32302c77d4085ecf495bdddb7f5e889">
   <xsd:schema xmlns:xsd="http://www.w3.org/2001/XMLSchema" xmlns:xs="http://www.w3.org/2001/XMLSchema" xmlns:p="http://schemas.microsoft.com/office/2006/metadata/properties" xmlns:ns2="a4f35948-e619-41b3-aa29-22878b09cfd2" xmlns:ns3="40262f94-9f35-4ac3-9a90-690165a166b7" targetNamespace="http://schemas.microsoft.com/office/2006/metadata/properties" ma:root="true" ma:fieldsID="4ab5ae46be95f9d0be6107e8200be7a2" ns2:_="" ns3:_="">
     <xsd:import namespace="a4f35948-e619-41b3-aa29-22878b09cfd2"/>
@@ -10569,17 +11382,6 @@
 </ct:contentTypeSchema>
 </file>
 
-<file path=customXml/item2.xml><?xml version="1.0" encoding="utf-8"?>
-<p:properties xmlns:p="http://schemas.microsoft.com/office/2006/metadata/properties" xmlns:xsi="http://www.w3.org/2001/XMLSchema-instance" xmlns:pc="http://schemas.microsoft.com/office/infopath/2007/PartnerControls">
-  <documentManagement>
-    <VSO_x0020_item_x0020_id xmlns="40262f94-9f35-4ac3-9a90-690165a166b7" xsi:nil="true"/>
-    <Assetid_x0020_ xmlns="40262f94-9f35-4ac3-9a90-690165a166b7" xsi:nil="true"/>
-    <Item_x0020_Details xmlns="40262f94-9f35-4ac3-9a90-690165a166b7" xsi:nil="true"/>
-    <Template_x0020_details xmlns="40262f94-9f35-4ac3-9a90-690165a166b7" xsi:nil="true"/>
-  </documentManagement>
-</p:properties>
-</file>
-
 <file path=customXml/item3.xml><?xml version="1.0" encoding="utf-8"?>
 <?mso-contentType ?>
 <FormTemplates xmlns="http://schemas.microsoft.com/sharepoint/v3/contenttype/forms">
@@ -10590,6 +11392,23 @@
 </file>
 
 <file path=customXml/itemProps1.xml><?xml version="1.0" encoding="utf-8"?>
+<ds:datastoreItem xmlns:ds="http://schemas.openxmlformats.org/officeDocument/2006/customXml" ds:itemID="{5E700CCB-20BA-4760-AB9F-AC3B63ED32E0}">
+  <ds:schemaRefs>
+    <ds:schemaRef ds:uri="http://schemas.microsoft.com/office/2006/metadata/properties"/>
+    <ds:schemaRef ds:uri="http://schemas.microsoft.com/office/2006/documentManagement/types"/>
+    <ds:schemaRef ds:uri="http://purl.org/dc/terms/"/>
+    <ds:schemaRef ds:uri="http://schemas.openxmlformats.org/package/2006/metadata/core-properties"/>
+    <ds:schemaRef ds:uri="http://purl.org/dc/dcmitype/"/>
+    <ds:schemaRef ds:uri="http://schemas.microsoft.com/office/infopath/2007/PartnerControls"/>
+    <ds:schemaRef ds:uri="http://purl.org/dc/elements/1.1/"/>
+    <ds:schemaRef ds:uri="40262f94-9f35-4ac3-9a90-690165a166b7"/>
+    <ds:schemaRef ds:uri="a4f35948-e619-41b3-aa29-22878b09cfd2"/>
+    <ds:schemaRef ds:uri="http://www.w3.org/XML/1998/namespace"/>
+  </ds:schemaRefs>
+</ds:datastoreItem>
+</file>
+
+<file path=customXml/itemProps2.xml><?xml version="1.0" encoding="utf-8"?>
 <ds:datastoreItem xmlns:ds="http://schemas.openxmlformats.org/officeDocument/2006/customXml" ds:itemID="{FB14945D-DABB-422F-9B28-D299995C9226}">
   <ds:schemaRefs>
     <ds:schemaRef ds:uri="http://schemas.microsoft.com/office/2006/metadata/contentType"/>
@@ -10608,23 +11427,6 @@
 </ds:datastoreItem>
 </file>
 
-<file path=customXml/itemProps2.xml><?xml version="1.0" encoding="utf-8"?>
-<ds:datastoreItem xmlns:ds="http://schemas.openxmlformats.org/officeDocument/2006/customXml" ds:itemID="{5E700CCB-20BA-4760-AB9F-AC3B63ED32E0}">
-  <ds:schemaRefs>
-    <ds:schemaRef ds:uri="http://schemas.microsoft.com/office/2006/metadata/properties"/>
-    <ds:schemaRef ds:uri="http://schemas.microsoft.com/office/2006/documentManagement/types"/>
-    <ds:schemaRef ds:uri="http://purl.org/dc/terms/"/>
-    <ds:schemaRef ds:uri="http://schemas.openxmlformats.org/package/2006/metadata/core-properties"/>
-    <ds:schemaRef ds:uri="http://purl.org/dc/dcmitype/"/>
-    <ds:schemaRef ds:uri="http://schemas.microsoft.com/office/infopath/2007/PartnerControls"/>
-    <ds:schemaRef ds:uri="http://purl.org/dc/elements/1.1/"/>
-    <ds:schemaRef ds:uri="40262f94-9f35-4ac3-9a90-690165a166b7"/>
-    <ds:schemaRef ds:uri="a4f35948-e619-41b3-aa29-22878b09cfd2"/>
-    <ds:schemaRef ds:uri="http://www.w3.org/XML/1998/namespace"/>
-  </ds:schemaRefs>
-</ds:datastoreItem>
-</file>
-
 <file path=customXml/itemProps3.xml><?xml version="1.0" encoding="utf-8"?>
 <ds:datastoreItem xmlns:ds="http://schemas.openxmlformats.org/officeDocument/2006/customXml" ds:itemID="{308942AA-0721-4324-BC2C-A3CB43F24E71}">
   <ds:schemaRefs>

</xml_diff>

<commit_message>
modification of order and pptx
</commit_message>
<xml_diff>
--- a/Fichiers analyse/IKitchen.pptx
+++ b/Fichiers analyse/IKitchen.pptx
@@ -248,7 +248,7 @@
             <a:pPr rtl="0"/>
             <a:fld id="{439A2291-0035-4D64-A7A5-F36AC1AF399D}" type="datetime1">
               <a:rPr lang="fr-FR" smtClean="0"/>
-              <a:t>21/05/2018</a:t>
+              <a:t>22/05/2018</a:t>
             </a:fld>
             <a:endParaRPr lang="fr-FR" dirty="0"/>
           </a:p>
@@ -316,7 +316,7 @@
             <a:pPr rtl="0"/>
             <a:fld id="{A8E322BB-75AD-4A1E-9661-2724167329F0}" type="slidenum">
               <a:rPr lang="fr-FR" smtClean="0"/>
-              <a:t>‹N°›</a:t>
+              <a:t>‹#›</a:t>
             </a:fld>
             <a:endParaRPr lang="fr-FR" dirty="0"/>
           </a:p>
@@ -418,7 +418,7 @@
             <a:pPr rtl="0"/>
             <a:fld id="{4419B5CD-CE9D-4F17-8DE3-0045DF2A06F1}" type="datetime1">
               <a:rPr lang="fr-FR" noProof="0" smtClean="0"/>
-              <a:t>21/05/2018</a:t>
+              <a:t>22/05/2018</a:t>
             </a:fld>
             <a:endParaRPr lang="fr-FR" noProof="0" dirty="0"/>
           </a:p>
@@ -579,7 +579,7 @@
             <a:pPr rtl="0"/>
             <a:fld id="{B045B7DE-1198-4F2F-B574-CA8CAE341642}" type="slidenum">
               <a:rPr lang="fr-FR" noProof="0" smtClean="0"/>
-              <a:t>‹N°›</a:t>
+              <a:t>‹#›</a:t>
             </a:fld>
             <a:endParaRPr lang="fr-FR" noProof="0" dirty="0"/>
           </a:p>
@@ -1587,7 +1587,7 @@
             <a:pPr rtl="0"/>
             <a:fld id="{FFED7672-6A17-4383-8E11-B703B2F244DD}" type="datetime1">
               <a:rPr lang="fr-FR" noProof="0" smtClean="0"/>
-              <a:t>21/05/2018</a:t>
+              <a:t>22/05/2018</a:t>
             </a:fld>
             <a:endParaRPr lang="fr-FR" noProof="0" dirty="0"/>
           </a:p>
@@ -1611,7 +1611,7 @@
             <a:pPr rtl="0"/>
             <a:fld id="{34C99D79-8A4B-4031-B1E0-AF26F8EDF2BC}" type="slidenum">
               <a:rPr lang="fr-FR" noProof="0" smtClean="0"/>
-              <a:t>‹N°›</a:t>
+              <a:t>‹#›</a:t>
             </a:fld>
             <a:endParaRPr lang="fr-FR" noProof="0" dirty="0"/>
           </a:p>
@@ -1792,7 +1792,7 @@
             <a:pPr rtl="0"/>
             <a:fld id="{E1450B91-7D53-40A4-B2F5-AA5E0059FF2C}" type="datetime1">
               <a:rPr lang="fr-FR" noProof="0" smtClean="0"/>
-              <a:t>21/05/2018</a:t>
+              <a:t>22/05/2018</a:t>
             </a:fld>
             <a:endParaRPr lang="fr-FR" noProof="0" dirty="0"/>
           </a:p>
@@ -1816,7 +1816,7 @@
             <a:pPr rtl="0"/>
             <a:fld id="{34C99D79-8A4B-4031-B1E0-AF26F8EDF2BC}" type="slidenum">
               <a:rPr lang="fr-FR" noProof="0" smtClean="0"/>
-              <a:t>‹N°›</a:t>
+              <a:t>‹#›</a:t>
             </a:fld>
             <a:endParaRPr lang="fr-FR" noProof="0" dirty="0"/>
           </a:p>
@@ -2346,7 +2346,7 @@
             <a:pPr rtl="0"/>
             <a:fld id="{3B681A6B-7357-4D25-8FC7-B90E847B95A8}" type="datetime1">
               <a:rPr lang="fr-FR" noProof="0" smtClean="0"/>
-              <a:t>21/05/2018</a:t>
+              <a:t>22/05/2018</a:t>
             </a:fld>
             <a:endParaRPr lang="fr-FR" noProof="0" dirty="0"/>
           </a:p>
@@ -2370,7 +2370,7 @@
             <a:pPr rtl="0"/>
             <a:fld id="{34C99D79-8A4B-4031-B1E0-AF26F8EDF2BC}" type="slidenum">
               <a:rPr lang="fr-FR" noProof="0" smtClean="0"/>
-              <a:t>‹N°›</a:t>
+              <a:t>‹#›</a:t>
             </a:fld>
             <a:endParaRPr lang="fr-FR" noProof="0" dirty="0"/>
           </a:p>
@@ -2551,7 +2551,7 @@
             <a:pPr rtl="0"/>
             <a:fld id="{80C5A66A-4BD8-442B-B2CE-4DDC3F185A34}" type="datetime1">
               <a:rPr lang="fr-FR" noProof="0" smtClean="0"/>
-              <a:t>21/05/2018</a:t>
+              <a:t>22/05/2018</a:t>
             </a:fld>
             <a:endParaRPr lang="fr-FR" noProof="0" dirty="0"/>
           </a:p>
@@ -2575,7 +2575,7 @@
             <a:pPr rtl="0"/>
             <a:fld id="{34C99D79-8A4B-4031-B1E0-AF26F8EDF2BC}" type="slidenum">
               <a:rPr lang="fr-FR" noProof="0" smtClean="0"/>
-              <a:t>‹N°›</a:t>
+              <a:t>‹#›</a:t>
             </a:fld>
             <a:endParaRPr lang="fr-FR" noProof="0" dirty="0"/>
           </a:p>
@@ -3159,7 +3159,7 @@
             <a:pPr rtl="0"/>
             <a:fld id="{70B7FDAA-B5D3-4E22-A82E-02191A2150B9}" type="datetime1">
               <a:rPr lang="fr-FR" noProof="0" smtClean="0"/>
-              <a:t>21/05/2018</a:t>
+              <a:t>22/05/2018</a:t>
             </a:fld>
             <a:endParaRPr lang="fr-FR" noProof="0" dirty="0"/>
           </a:p>
@@ -3183,7 +3183,7 @@
             <a:pPr rtl="0"/>
             <a:fld id="{34C99D79-8A4B-4031-B1E0-AF26F8EDF2BC}" type="slidenum">
               <a:rPr lang="fr-FR" noProof="0" smtClean="0"/>
-              <a:t>‹N°›</a:t>
+              <a:t>‹#›</a:t>
             </a:fld>
             <a:endParaRPr lang="fr-FR" noProof="0" dirty="0"/>
           </a:p>
@@ -3475,7 +3475,7 @@
             <a:pPr rtl="0"/>
             <a:fld id="{BADF8559-33F4-416D-A710-49A46B99982C}" type="datetime1">
               <a:rPr lang="fr-FR" noProof="0" smtClean="0"/>
-              <a:t>21/05/2018</a:t>
+              <a:t>22/05/2018</a:t>
             </a:fld>
             <a:endParaRPr lang="fr-FR" noProof="0" dirty="0"/>
           </a:p>
@@ -3499,7 +3499,7 @@
             <a:pPr rtl="0"/>
             <a:fld id="{34C99D79-8A4B-4031-B1E0-AF26F8EDF2BC}" type="slidenum">
               <a:rPr lang="fr-FR" noProof="0" smtClean="0"/>
-              <a:t>‹N°›</a:t>
+              <a:t>‹#›</a:t>
             </a:fld>
             <a:endParaRPr lang="fr-FR" noProof="0" dirty="0"/>
           </a:p>
@@ -3941,7 +3941,7 @@
             <a:pPr rtl="0"/>
             <a:fld id="{CF92E5DF-51C7-4012-82D0-A6F20F8A1C3B}" type="datetime1">
               <a:rPr lang="fr-FR" noProof="0" smtClean="0"/>
-              <a:t>21/05/2018</a:t>
+              <a:t>22/05/2018</a:t>
             </a:fld>
             <a:endParaRPr lang="fr-FR" noProof="0" dirty="0"/>
           </a:p>
@@ -3965,7 +3965,7 @@
             <a:pPr rtl="0"/>
             <a:fld id="{34C99D79-8A4B-4031-B1E0-AF26F8EDF2BC}" type="slidenum">
               <a:rPr lang="fr-FR" noProof="0" smtClean="0"/>
-              <a:t>‹N°›</a:t>
+              <a:t>‹#›</a:t>
             </a:fld>
             <a:endParaRPr lang="fr-FR" noProof="0" dirty="0"/>
           </a:p>
@@ -4078,7 +4078,7 @@
             <a:pPr rtl="0"/>
             <a:fld id="{A66353DA-E3F6-4188-A918-D5978D2DC352}" type="datetime1">
               <a:rPr lang="fr-FR" noProof="0" smtClean="0"/>
-              <a:t>21/05/2018</a:t>
+              <a:t>22/05/2018</a:t>
             </a:fld>
             <a:endParaRPr lang="fr-FR" noProof="0" dirty="0"/>
           </a:p>
@@ -4102,7 +4102,7 @@
             <a:pPr rtl="0"/>
             <a:fld id="{34C99D79-8A4B-4031-B1E0-AF26F8EDF2BC}" type="slidenum">
               <a:rPr lang="fr-FR" noProof="0" smtClean="0"/>
-              <a:t>‹N°›</a:t>
+              <a:t>‹#›</a:t>
             </a:fld>
             <a:endParaRPr lang="fr-FR" noProof="0" dirty="0"/>
           </a:p>
@@ -4374,7 +4374,7 @@
             <a:pPr rtl="0"/>
             <a:fld id="{227CDB5E-87EB-400A-AF0C-7B4E7074CB2E}" type="datetime1">
               <a:rPr lang="fr-FR" noProof="0" smtClean="0"/>
-              <a:t>21/05/2018</a:t>
+              <a:t>22/05/2018</a:t>
             </a:fld>
             <a:endParaRPr lang="fr-FR" noProof="0" dirty="0"/>
           </a:p>
@@ -4398,7 +4398,7 @@
             <a:pPr rtl="0"/>
             <a:fld id="{34C99D79-8A4B-4031-B1E0-AF26F8EDF2BC}" type="slidenum">
               <a:rPr lang="fr-FR" noProof="0" smtClean="0"/>
-              <a:t>‹N°›</a:t>
+              <a:t>‹#›</a:t>
             </a:fld>
             <a:endParaRPr lang="fr-FR" noProof="0" dirty="0"/>
           </a:p>
@@ -4677,7 +4677,7 @@
             <a:pPr rtl="0"/>
             <a:fld id="{9B92CBFA-02BE-4A2B-B3DF-CE42DCACD8FF}" type="datetime1">
               <a:rPr lang="fr-FR" noProof="0" smtClean="0"/>
-              <a:t>21/05/2018</a:t>
+              <a:t>22/05/2018</a:t>
             </a:fld>
             <a:endParaRPr lang="fr-FR" noProof="0" dirty="0"/>
           </a:p>
@@ -4701,7 +4701,7 @@
             <a:pPr rtl="0"/>
             <a:fld id="{34C99D79-8A4B-4031-B1E0-AF26F8EDF2BC}" type="slidenum">
               <a:rPr lang="fr-FR" noProof="0" smtClean="0"/>
-              <a:t>‹N°›</a:t>
+              <a:t>‹#›</a:t>
             </a:fld>
             <a:endParaRPr lang="fr-FR" noProof="0" dirty="0"/>
           </a:p>
@@ -4966,7 +4966,7 @@
             <a:pPr rtl="0"/>
             <a:fld id="{5B8044B4-8DC2-481B-A751-5605C20AC4B9}" type="datetime1">
               <a:rPr lang="fr-FR" noProof="0" smtClean="0"/>
-              <a:t>21/05/2018</a:t>
+              <a:t>22/05/2018</a:t>
             </a:fld>
             <a:endParaRPr lang="fr-FR" noProof="0" dirty="0"/>
           </a:p>
@@ -4990,7 +4990,7 @@
             <a:pPr rtl="0"/>
             <a:fld id="{34C99D79-8A4B-4031-B1E0-AF26F8EDF2BC}" type="slidenum">
               <a:rPr lang="fr-FR" noProof="0" smtClean="0"/>
-              <a:t>‹N°›</a:t>
+              <a:t>‹#›</a:t>
             </a:fld>
             <a:endParaRPr lang="fr-FR" noProof="0" dirty="0"/>
           </a:p>
@@ -5549,7 +5549,7 @@
             <a:pPr rtl="0"/>
             <a:fld id="{01DFB95D-D541-4088-8BCE-2FF8F06A12B2}" type="datetime1">
               <a:rPr lang="fr-FR" noProof="0" smtClean="0"/>
-              <a:t>21/05/2018</a:t>
+              <a:t>22/05/2018</a:t>
             </a:fld>
             <a:endParaRPr lang="fr-FR" noProof="0" dirty="0"/>
           </a:p>
@@ -5590,7 +5590,7 @@
             <a:fld id="{34C99D79-8A4B-4031-B1E0-AF26F8EDF2BC}" type="slidenum">
               <a:rPr lang="fr-FR" noProof="0" smtClean="0"/>
               <a:pPr rtl="0"/>
-              <a:t>‹N°›</a:t>
+              <a:t>‹#›</a:t>
             </a:fld>
             <a:endParaRPr lang="fr-FR" noProof="0" dirty="0"/>
           </a:p>
@@ -9140,7 +9140,7 @@
         <p:spPr>
           <a:xfrm>
             <a:off x="7894612" y="2413000"/>
-            <a:ext cx="3152800" cy="3785652"/>
+            <a:ext cx="3152800" cy="5632311"/>
           </a:xfrm>
           <a:prstGeom prst="rect">
             <a:avLst/>
@@ -9157,6 +9157,112 @@
               <a:buFont typeface="Arial" panose="020B0604020202020204" pitchFamily="34" charset="0"/>
               <a:buChar char="•"/>
             </a:pPr>
+            <a:r>
+              <a:rPr lang="fr-BE" sz="2000" dirty="0"/>
+              <a:t>Like to </a:t>
+            </a:r>
+            <a:r>
+              <a:rPr lang="fr-BE" sz="2000" dirty="0" err="1"/>
+              <a:t>work</a:t>
+            </a:r>
+            <a:r>
+              <a:rPr lang="fr-BE" sz="2000" dirty="0"/>
+              <a:t> in a team</a:t>
+            </a:r>
+          </a:p>
+          <a:p>
+            <a:pPr marL="342900" indent="-342900">
+              <a:buFont typeface="Arial" panose="020B0604020202020204" pitchFamily="34" charset="0"/>
+              <a:buChar char="•"/>
+            </a:pPr>
+            <a:r>
+              <a:rPr lang="fr-BE" sz="2000" dirty="0" err="1"/>
+              <a:t>Learn</a:t>
+            </a:r>
+            <a:r>
+              <a:rPr lang="fr-BE" sz="2000" dirty="0"/>
+              <a:t> new </a:t>
+            </a:r>
+            <a:r>
+              <a:rPr lang="fr-BE" sz="2000" dirty="0" err="1"/>
+              <a:t>things</a:t>
+            </a:r>
+            <a:r>
+              <a:rPr lang="fr-BE" sz="2000" dirty="0"/>
+              <a:t> about </a:t>
+            </a:r>
+            <a:r>
+              <a:rPr lang="fr-BE" sz="2000" dirty="0" err="1"/>
+              <a:t>Entity</a:t>
+            </a:r>
+            <a:r>
+              <a:rPr lang="fr-BE" sz="2000" dirty="0"/>
+              <a:t> Framework</a:t>
+            </a:r>
+          </a:p>
+          <a:p>
+            <a:pPr marL="342900" indent="-342900">
+              <a:buFont typeface="Arial" panose="020B0604020202020204" pitchFamily="34" charset="0"/>
+              <a:buChar char="•"/>
+            </a:pPr>
+            <a:r>
+              <a:rPr lang="fr-BE" sz="2000" dirty="0" err="1"/>
+              <a:t>Learn</a:t>
+            </a:r>
+            <a:r>
+              <a:rPr lang="fr-BE" sz="2000" dirty="0"/>
+              <a:t> how to </a:t>
+            </a:r>
+            <a:r>
+              <a:rPr lang="fr-BE" sz="2000" dirty="0" err="1"/>
+              <a:t>adapt</a:t>
+            </a:r>
+            <a:r>
+              <a:rPr lang="fr-BE" sz="2000" dirty="0"/>
+              <a:t> </a:t>
+            </a:r>
+            <a:r>
+              <a:rPr lang="fr-BE" sz="2000" dirty="0" err="1"/>
+              <a:t>you</a:t>
+            </a:r>
+            <a:r>
+              <a:rPr lang="fr-BE" sz="2000" dirty="0"/>
+              <a:t> at a deadline</a:t>
+            </a:r>
+          </a:p>
+          <a:p>
+            <a:pPr marL="342900" indent="-342900">
+              <a:buFont typeface="Arial" panose="020B0604020202020204" pitchFamily="34" charset="0"/>
+              <a:buChar char="•"/>
+            </a:pPr>
+            <a:r>
+              <a:rPr lang="fr-BE" sz="2000" dirty="0" err="1"/>
+              <a:t>It’s</a:t>
+            </a:r>
+            <a:r>
+              <a:rPr lang="fr-BE" sz="2000" dirty="0"/>
+              <a:t> </a:t>
+            </a:r>
+            <a:r>
+              <a:rPr lang="fr-BE" sz="2000" dirty="0" err="1"/>
+              <a:t>difficult</a:t>
+            </a:r>
+            <a:r>
+              <a:rPr lang="fr-BE" sz="2000" dirty="0"/>
+              <a:t> to </a:t>
+            </a:r>
+            <a:r>
+              <a:rPr lang="fr-BE" sz="2000" dirty="0" err="1"/>
+              <a:t>work</a:t>
+            </a:r>
+            <a:r>
+              <a:rPr lang="fr-BE" sz="2000" dirty="0"/>
+              <a:t> in group </a:t>
+            </a:r>
+            <a:r>
+              <a:rPr lang="fr-BE" sz="2000" dirty="0" err="1"/>
+              <a:t>sometimes</a:t>
+            </a:r>
             <a:endParaRPr lang="fr-BE" sz="2000" dirty="0"/>
           </a:p>
           <a:p>
@@ -11314,6 +11420,17 @@
 </file>
 
 <file path=customXml/item1.xml><?xml version="1.0" encoding="utf-8"?>
+<p:properties xmlns:p="http://schemas.microsoft.com/office/2006/metadata/properties" xmlns:xsi="http://www.w3.org/2001/XMLSchema-instance" xmlns:pc="http://schemas.microsoft.com/office/infopath/2007/PartnerControls">
+  <documentManagement>
+    <VSO_x0020_item_x0020_id xmlns="40262f94-9f35-4ac3-9a90-690165a166b7" xsi:nil="true"/>
+    <Assetid_x0020_ xmlns="40262f94-9f35-4ac3-9a90-690165a166b7" xsi:nil="true"/>
+    <Item_x0020_Details xmlns="40262f94-9f35-4ac3-9a90-690165a166b7" xsi:nil="true"/>
+    <Template_x0020_details xmlns="40262f94-9f35-4ac3-9a90-690165a166b7" xsi:nil="true"/>
+  </documentManagement>
+</p:properties>
+</file>
+
+<file path=customXml/item2.xml><?xml version="1.0" encoding="utf-8"?>
 <ct:contentTypeSchema xmlns:ct="http://schemas.microsoft.com/office/2006/metadata/contentType" xmlns:ma="http://schemas.microsoft.com/office/2006/metadata/properties/metaAttributes" ct:_="" ma:_="" ma:contentTypeName="Document" ma:contentTypeID="0x010100AA3F7D94069FF64A86F7DFF56D60E3BE" ma:contentTypeVersion="6" ma:contentTypeDescription="Create a new document." ma:contentTypeScope="" ma:versionID="c32302c77d4085ecf495bdddb7f5e889">
   <xsd:schema xmlns:xsd="http://www.w3.org/2001/XMLSchema" xmlns:xs="http://www.w3.org/2001/XMLSchema" xmlns:p="http://schemas.microsoft.com/office/2006/metadata/properties" xmlns:ns2="a4f35948-e619-41b3-aa29-22878b09cfd2" xmlns:ns3="40262f94-9f35-4ac3-9a90-690165a166b7" targetNamespace="http://schemas.microsoft.com/office/2006/metadata/properties" ma:root="true" ma:fieldsID="4ab5ae46be95f9d0be6107e8200be7a2" ns2:_="" ns3:_="">
     <xsd:import namespace="a4f35948-e619-41b3-aa29-22878b09cfd2"/>
@@ -11494,17 +11611,6 @@
 </ct:contentTypeSchema>
 </file>
 
-<file path=customXml/item2.xml><?xml version="1.0" encoding="utf-8"?>
-<p:properties xmlns:p="http://schemas.microsoft.com/office/2006/metadata/properties" xmlns:xsi="http://www.w3.org/2001/XMLSchema-instance" xmlns:pc="http://schemas.microsoft.com/office/infopath/2007/PartnerControls">
-  <documentManagement>
-    <VSO_x0020_item_x0020_id xmlns="40262f94-9f35-4ac3-9a90-690165a166b7" xsi:nil="true"/>
-    <Assetid_x0020_ xmlns="40262f94-9f35-4ac3-9a90-690165a166b7" xsi:nil="true"/>
-    <Item_x0020_Details xmlns="40262f94-9f35-4ac3-9a90-690165a166b7" xsi:nil="true"/>
-    <Template_x0020_details xmlns="40262f94-9f35-4ac3-9a90-690165a166b7" xsi:nil="true"/>
-  </documentManagement>
-</p:properties>
-</file>
-
 <file path=customXml/item3.xml><?xml version="1.0" encoding="utf-8"?>
 <?mso-contentType ?>
 <FormTemplates xmlns="http://schemas.microsoft.com/sharepoint/v3/contenttype/forms">
@@ -11515,6 +11621,23 @@
 </file>
 
 <file path=customXml/itemProps1.xml><?xml version="1.0" encoding="utf-8"?>
+<ds:datastoreItem xmlns:ds="http://schemas.openxmlformats.org/officeDocument/2006/customXml" ds:itemID="{5E700CCB-20BA-4760-AB9F-AC3B63ED32E0}">
+  <ds:schemaRefs>
+    <ds:schemaRef ds:uri="http://schemas.microsoft.com/office/2006/metadata/properties"/>
+    <ds:schemaRef ds:uri="http://schemas.microsoft.com/office/2006/documentManagement/types"/>
+    <ds:schemaRef ds:uri="http://purl.org/dc/terms/"/>
+    <ds:schemaRef ds:uri="http://schemas.openxmlformats.org/package/2006/metadata/core-properties"/>
+    <ds:schemaRef ds:uri="http://purl.org/dc/dcmitype/"/>
+    <ds:schemaRef ds:uri="http://schemas.microsoft.com/office/infopath/2007/PartnerControls"/>
+    <ds:schemaRef ds:uri="http://purl.org/dc/elements/1.1/"/>
+    <ds:schemaRef ds:uri="40262f94-9f35-4ac3-9a90-690165a166b7"/>
+    <ds:schemaRef ds:uri="a4f35948-e619-41b3-aa29-22878b09cfd2"/>
+    <ds:schemaRef ds:uri="http://www.w3.org/XML/1998/namespace"/>
+  </ds:schemaRefs>
+</ds:datastoreItem>
+</file>
+
+<file path=customXml/itemProps2.xml><?xml version="1.0" encoding="utf-8"?>
 <ds:datastoreItem xmlns:ds="http://schemas.openxmlformats.org/officeDocument/2006/customXml" ds:itemID="{FB14945D-DABB-422F-9B28-D299995C9226}">
   <ds:schemaRefs>
     <ds:schemaRef ds:uri="http://schemas.microsoft.com/office/2006/metadata/contentType"/>
@@ -11533,23 +11656,6 @@
 </ds:datastoreItem>
 </file>
 
-<file path=customXml/itemProps2.xml><?xml version="1.0" encoding="utf-8"?>
-<ds:datastoreItem xmlns:ds="http://schemas.openxmlformats.org/officeDocument/2006/customXml" ds:itemID="{5E700CCB-20BA-4760-AB9F-AC3B63ED32E0}">
-  <ds:schemaRefs>
-    <ds:schemaRef ds:uri="http://schemas.microsoft.com/office/2006/metadata/properties"/>
-    <ds:schemaRef ds:uri="http://schemas.microsoft.com/office/2006/documentManagement/types"/>
-    <ds:schemaRef ds:uri="http://purl.org/dc/terms/"/>
-    <ds:schemaRef ds:uri="http://schemas.openxmlformats.org/package/2006/metadata/core-properties"/>
-    <ds:schemaRef ds:uri="http://purl.org/dc/dcmitype/"/>
-    <ds:schemaRef ds:uri="http://schemas.microsoft.com/office/infopath/2007/PartnerControls"/>
-    <ds:schemaRef ds:uri="http://purl.org/dc/elements/1.1/"/>
-    <ds:schemaRef ds:uri="40262f94-9f35-4ac3-9a90-690165a166b7"/>
-    <ds:schemaRef ds:uri="a4f35948-e619-41b3-aa29-22878b09cfd2"/>
-    <ds:schemaRef ds:uri="http://www.w3.org/XML/1998/namespace"/>
-  </ds:schemaRefs>
-</ds:datastoreItem>
-</file>
-
 <file path=customXml/itemProps3.xml><?xml version="1.0" encoding="utf-8"?>
 <ds:datastoreItem xmlns:ds="http://schemas.openxmlformats.org/officeDocument/2006/customXml" ds:itemID="{308942AA-0721-4324-BC2C-A3CB43F24E71}">
   <ds:schemaRefs>

</xml_diff>